<commit_message>
last but not least
</commit_message>
<xml_diff>
--- a/Othello-groupe1.pptx
+++ b/Othello-groupe1.pptx
@@ -16,10 +16,10 @@
     <p:sldId id="269" r:id="rId10"/>
     <p:sldId id="268" r:id="rId11"/>
     <p:sldId id="270" r:id="rId12"/>
-    <p:sldId id="262" r:id="rId13"/>
-    <p:sldId id="271" r:id="rId14"/>
-    <p:sldId id="273" r:id="rId15"/>
-    <p:sldId id="272" r:id="rId16"/>
+    <p:sldId id="272" r:id="rId13"/>
+    <p:sldId id="262" r:id="rId14"/>
+    <p:sldId id="271" r:id="rId15"/>
+    <p:sldId id="273" r:id="rId16"/>
     <p:sldId id="263" r:id="rId17"/>
   </p:sldIdLst>
   <p:sldSz cx="12192000" cy="6858000"/>
@@ -142,6 +142,7 @@
     <p1510:client id="{823EE39A-A949-DC88-5A0C-26FF047FE62A}" v="28" dt="2021-02-25T21:00:58.082"/>
     <p1510:client id="{8AC9AE9F-404A-B000-A459-CDD9E7B79D87}" v="316" dt="2021-02-25T18:54:35.158"/>
     <p1510:client id="{9DF44500-50CB-4942-42DC-0F1675F36EE1}" v="38" dt="2021-03-01T09:46:38.174"/>
+    <p1510:client id="{AADC2EEE-EE0B-646D-8D36-BE3D42821113}" v="1214" dt="2021-04-11T22:11:48.109"/>
     <p1510:client id="{B2DFED35-CDD3-8F5D-FE30-58D4E5730845}" v="143" dt="2021-02-24T20:47:34.086"/>
     <p1510:client id="{B601AF9F-60F7-B000-E2D7-A37881F0A0F8}" v="81" dt="2021-02-26T10:52:30.411"/>
     <p1510:client id="{B806E700-4E81-9DD8-E84F-398FFABF467D}" v="737" dt="2021-02-22T22:25:34.558"/>
@@ -321,7 +322,7 @@
             <a:fld id="{87DE6118-2437-4B30-8E3C-4D2BE6020583}" type="datetimeFigureOut">
               <a:rPr lang="en-US" dirty="0"/>
               <a:pPr/>
-              <a:t>4/8/2021</a:t>
+              <a:t>4/12/2021</a:t>
             </a:fld>
             <a:endParaRPr lang="en-US"/>
           </a:p>
@@ -645,7 +646,7 @@
           <a:p>
             <a:fld id="{87DE6118-2437-4B30-8E3C-4D2BE6020583}" type="datetimeFigureOut">
               <a:rPr lang="en-US" dirty="0"/>
-              <a:t>4/8/2021</a:t>
+              <a:t>4/12/2021</a:t>
             </a:fld>
             <a:endParaRPr lang="en-US"/>
           </a:p>
@@ -818,7 +819,7 @@
           <a:p>
             <a:fld id="{87DE6118-2437-4B30-8E3C-4D2BE6020583}" type="datetimeFigureOut">
               <a:rPr lang="en-US" dirty="0"/>
-              <a:t>4/8/2021</a:t>
+              <a:t>4/12/2021</a:t>
             </a:fld>
             <a:endParaRPr lang="en-US"/>
           </a:p>
@@ -981,7 +982,7 @@
           <a:p>
             <a:fld id="{87DE6118-2437-4B30-8E3C-4D2BE6020583}" type="datetimeFigureOut">
               <a:rPr lang="en-US" dirty="0"/>
-              <a:t>4/8/2021</a:t>
+              <a:t>4/12/2021</a:t>
             </a:fld>
             <a:endParaRPr lang="en-US"/>
           </a:p>
@@ -1253,7 +1254,7 @@
             <a:fld id="{87DE6118-2437-4B30-8E3C-4D2BE6020583}" type="datetimeFigureOut">
               <a:rPr lang="en-US" dirty="0"/>
               <a:pPr/>
-              <a:t>4/8/2021</a:t>
+              <a:t>4/12/2021</a:t>
             </a:fld>
             <a:endParaRPr lang="en-US"/>
           </a:p>
@@ -1640,7 +1641,7 @@
           <a:p>
             <a:fld id="{87DE6118-2437-4B30-8E3C-4D2BE6020583}" type="datetimeFigureOut">
               <a:rPr lang="en-US" dirty="0"/>
-              <a:t>4/8/2021</a:t>
+              <a:t>4/12/2021</a:t>
             </a:fld>
             <a:endParaRPr lang="en-US"/>
           </a:p>
@@ -2109,7 +2110,7 @@
           <a:p>
             <a:fld id="{87DE6118-2437-4B30-8E3C-4D2BE6020583}" type="datetimeFigureOut">
               <a:rPr lang="en-US" dirty="0"/>
-              <a:t>4/8/2021</a:t>
+              <a:t>4/12/2021</a:t>
             </a:fld>
             <a:endParaRPr lang="en-US"/>
           </a:p>
@@ -2221,7 +2222,7 @@
           <a:p>
             <a:fld id="{87DE6118-2437-4B30-8E3C-4D2BE6020583}" type="datetimeFigureOut">
               <a:rPr lang="en-US" dirty="0"/>
-              <a:t>4/8/2021</a:t>
+              <a:t>4/12/2021</a:t>
             </a:fld>
             <a:endParaRPr lang="en-US"/>
           </a:p>
@@ -2311,7 +2312,7 @@
           <a:p>
             <a:fld id="{87DE6118-2437-4B30-8E3C-4D2BE6020583}" type="datetimeFigureOut">
               <a:rPr lang="en-US" dirty="0"/>
-              <a:t>4/8/2021</a:t>
+              <a:t>4/12/2021</a:t>
             </a:fld>
             <a:endParaRPr lang="en-US"/>
           </a:p>
@@ -2651,7 +2652,7 @@
             <a:fld id="{87DE6118-2437-4B30-8E3C-4D2BE6020583}" type="datetimeFigureOut">
               <a:rPr lang="en-US" dirty="0"/>
               <a:pPr/>
-              <a:t>4/8/2021</a:t>
+              <a:t>4/12/2021</a:t>
             </a:fld>
             <a:endParaRPr lang="en-US"/>
           </a:p>
@@ -3034,7 +3035,7 @@
             <a:fld id="{87DE6118-2437-4B30-8E3C-4D2BE6020583}" type="datetimeFigureOut">
               <a:rPr lang="en-US" dirty="0"/>
               <a:pPr/>
-              <a:t>4/8/2021</a:t>
+              <a:t>4/12/2021</a:t>
             </a:fld>
             <a:endParaRPr lang="en-US"/>
           </a:p>
@@ -3307,7 +3308,7 @@
             <a:fld id="{87DE6118-2437-4B30-8E3C-4D2BE6020583}" type="datetimeFigureOut">
               <a:rPr lang="en-US" dirty="0"/>
               <a:pPr/>
-              <a:t>4/8/2021</a:t>
+              <a:t>4/12/2021</a:t>
             </a:fld>
             <a:endParaRPr lang="en-US"/>
           </a:p>
@@ -4967,13 +4968,13 @@
           <a:p>
             <a:pPr marL="383540" indent="-383540"/>
             <a:r>
-              <a:rPr lang="fr-FR" sz="2800" dirty="0">
+              <a:rPr lang="fr-FR" sz="2800">
                 <a:ea typeface="+mn-lt"/>
                 <a:cs typeface="+mn-lt"/>
               </a:rPr>
               <a:t>La partie se termine lorsque toutes les cases du plateau sont occupées ou lorsqu’aucun des deux joueurs ne peut ajouter un nouveau pion au plateau, c'est à dire qu'il n'y a plus de retournement possible. C'est le joueur qui a le plus de pions de sa couleur sur le plateau qui remporte la partie</a:t>
             </a:r>
-            <a:endParaRPr lang="fr-FR" sz="2800" dirty="0"/>
+            <a:endParaRPr lang="fr-FR" sz="2800"/>
           </a:p>
         </p:txBody>
       </p:sp>
@@ -5263,1300 +5264,6 @@
 </file>
 
 <file path=ppt/slides/slide12.xml><?xml version="1.0" encoding="utf-8"?>
-<p:sld xmlns:a="http://schemas.openxmlformats.org/drawingml/2006/main" xmlns:r="http://schemas.openxmlformats.org/officeDocument/2006/relationships" xmlns:p="http://schemas.openxmlformats.org/presentationml/2006/main">
-  <p:cSld>
-    <p:spTree>
-      <p:nvGrpSpPr>
-        <p:cNvPr id="1" name=""/>
-        <p:cNvGrpSpPr/>
-        <p:nvPr/>
-      </p:nvGrpSpPr>
-      <p:grpSpPr>
-        <a:xfrm>
-          <a:off x="0" y="0"/>
-          <a:ext cx="0" cy="0"/>
-          <a:chOff x="0" y="0"/>
-          <a:chExt cx="0" cy="0"/>
-        </a:xfrm>
-      </p:grpSpPr>
-      <p:sp>
-        <p:nvSpPr>
-          <p:cNvPr id="2" name="Titre 1">
-            <a:extLst>
-              <a:ext uri="{FF2B5EF4-FFF2-40B4-BE49-F238E27FC236}">
-                <a16:creationId xmlns="" xmlns:a16="http://schemas.microsoft.com/office/drawing/2014/main" id="{8F8ED102-DB70-4795-8F34-9EE6F6978AAE}"/>
-              </a:ext>
-            </a:extLst>
-          </p:cNvPr>
-          <p:cNvSpPr>
-            <a:spLocks noGrp="1"/>
-          </p:cNvSpPr>
-          <p:nvPr>
-            <p:ph type="title"/>
-          </p:nvPr>
-        </p:nvSpPr>
-        <p:spPr/>
-        <p:txBody>
-          <a:bodyPr/>
-          <a:lstStyle/>
-          <a:p>
-            <a:pPr algn="ctr"/>
-            <a:r>
-              <a:rPr lang="fr-FR" dirty="0"/>
-              <a:t>Les classes, les méthodes </a:t>
-            </a:r>
-            <a:br>
-              <a:rPr lang="fr-FR" dirty="0"/>
-            </a:br>
-            <a:r>
-              <a:rPr lang="fr-FR" dirty="0"/>
-              <a:t>et les attributs</a:t>
-            </a:r>
-          </a:p>
-        </p:txBody>
-      </p:sp>
-      <p:sp>
-        <p:nvSpPr>
-          <p:cNvPr id="3" name="ZoneTexte 2">
-            <a:extLst>
-              <a:ext uri="{FF2B5EF4-FFF2-40B4-BE49-F238E27FC236}">
-                <a16:creationId xmlns="" xmlns:a16="http://schemas.microsoft.com/office/drawing/2014/main" id="{33F8762C-9F81-40CC-84C9-097B610492BB}"/>
-              </a:ext>
-            </a:extLst>
-          </p:cNvPr>
-          <p:cNvSpPr txBox="1"/>
-          <p:nvPr/>
-        </p:nvSpPr>
-        <p:spPr>
-          <a:xfrm>
-            <a:off x="1763232" y="1914082"/>
-            <a:ext cx="9518325" cy="4893647"/>
-          </a:xfrm>
-          <a:prstGeom prst="rect">
-            <a:avLst/>
-          </a:prstGeom>
-          <a:noFill/>
-        </p:spPr>
-        <p:txBody>
-          <a:bodyPr rot="0" spcFirstLastPara="0" vertOverflow="overflow" horzOverflow="overflow" vert="horz" wrap="square" lIns="91440" tIns="45720" rIns="91440" bIns="45720" numCol="1" spcCol="0" rtlCol="0" fromWordArt="0" anchor="t" anchorCtr="0" forceAA="0" compatLnSpc="1">
-            <a:prstTxWarp prst="textNoShape">
-              <a:avLst/>
-            </a:prstTxWarp>
-            <a:spAutoFit/>
-          </a:bodyPr>
-          <a:lstStyle/>
-          <a:p>
-            <a:r>
-              <a:rPr lang="fr-FR" sz="2400" b="1" dirty="0">
-                <a:solidFill>
-                  <a:schemeClr val="bg2">
-                    <a:lumMod val="50000"/>
-                  </a:schemeClr>
-                </a:solidFill>
-              </a:rPr>
-              <a:t>Les classes:</a:t>
-            </a:r>
-          </a:p>
-          <a:p>
-            <a:r>
-              <a:rPr lang="fr-FR" b="1" dirty="0"/>
-              <a:t>-</a:t>
-            </a:r>
-            <a:r>
-              <a:rPr lang="fr-FR" b="1" dirty="0" err="1"/>
-              <a:t>Othelloboard</a:t>
-            </a:r>
-            <a:r>
-              <a:rPr lang="fr-FR" b="1" dirty="0"/>
-              <a:t>: </a:t>
-            </a:r>
-          </a:p>
-          <a:p>
-            <a:r>
-              <a:rPr lang="fr-FR" dirty="0"/>
-              <a:t>     Attributs:</a:t>
-            </a:r>
-          </a:p>
-          <a:p>
-            <a:r>
-              <a:rPr lang="fr-FR" dirty="0"/>
-              <a:t>            Int </a:t>
-            </a:r>
-            <a:r>
-              <a:rPr lang="fr-FR" dirty="0" err="1"/>
-              <a:t>pos_actuelle</a:t>
-            </a:r>
-            <a:r>
-              <a:rPr lang="fr-FR" dirty="0"/>
-              <a:t>[8][8</a:t>
-            </a:r>
-            <a:r>
-              <a:rPr lang="fr-FR" dirty="0" smtClean="0"/>
-              <a:t>] ;</a:t>
-            </a:r>
-            <a:endParaRPr lang="fr-FR" dirty="0"/>
-          </a:p>
-          <a:p>
-            <a:r>
-              <a:rPr lang="fr-FR" dirty="0"/>
-              <a:t>            </a:t>
-            </a:r>
-            <a:r>
-              <a:rPr lang="fr-FR" dirty="0" err="1"/>
-              <a:t>int</a:t>
-            </a:r>
-            <a:r>
-              <a:rPr lang="fr-FR" dirty="0"/>
-              <a:t> </a:t>
-            </a:r>
-            <a:r>
-              <a:rPr lang="fr-FR" dirty="0" err="1" smtClean="0"/>
-              <a:t>score_noir</a:t>
-            </a:r>
-            <a:r>
-              <a:rPr lang="fr-FR" dirty="0" smtClean="0"/>
-              <a:t> ;</a:t>
-            </a:r>
-            <a:endParaRPr lang="fr-FR" dirty="0"/>
-          </a:p>
-          <a:p>
-            <a:r>
-              <a:rPr lang="fr-FR" dirty="0"/>
-              <a:t>            Int </a:t>
-            </a:r>
-            <a:r>
-              <a:rPr lang="fr-FR" dirty="0" err="1" smtClean="0"/>
-              <a:t>score_blanc</a:t>
-            </a:r>
-            <a:r>
-              <a:rPr lang="fr-FR" dirty="0" smtClean="0"/>
-              <a:t> ;</a:t>
-            </a:r>
-            <a:endParaRPr lang="fr-FR" dirty="0"/>
-          </a:p>
-          <a:p>
-            <a:r>
-              <a:rPr lang="fr-FR" dirty="0"/>
-              <a:t>            </a:t>
-            </a:r>
-            <a:r>
-              <a:rPr lang="fr-FR" dirty="0" err="1"/>
-              <a:t>Bool</a:t>
-            </a:r>
-            <a:r>
-              <a:rPr lang="fr-FR" dirty="0"/>
-              <a:t> </a:t>
-            </a:r>
-            <a:r>
-              <a:rPr lang="fr-FR" dirty="0" err="1" smtClean="0"/>
-              <a:t>finished</a:t>
-            </a:r>
-            <a:r>
-              <a:rPr lang="fr-FR" dirty="0" smtClean="0"/>
-              <a:t> ;</a:t>
-            </a:r>
-            <a:endParaRPr lang="fr-FR" dirty="0"/>
-          </a:p>
-          <a:p>
-            <a:endParaRPr lang="fr-FR" dirty="0"/>
-          </a:p>
-          <a:p>
-            <a:r>
-              <a:rPr lang="fr-FR" dirty="0"/>
-              <a:t>     Méthodes:</a:t>
-            </a:r>
-          </a:p>
-          <a:p>
-            <a:r>
-              <a:rPr lang="fr-FR" dirty="0"/>
-              <a:t>            </a:t>
-            </a:r>
-            <a:r>
-              <a:rPr lang="fr-FR" dirty="0" err="1"/>
-              <a:t>Othelloboard</a:t>
-            </a:r>
-            <a:r>
-              <a:rPr lang="fr-FR" dirty="0"/>
-              <a:t>();</a:t>
-            </a:r>
-          </a:p>
-          <a:p>
-            <a:r>
-              <a:rPr lang="fr-FR" dirty="0"/>
-              <a:t>            ~</a:t>
-            </a:r>
-            <a:r>
-              <a:rPr lang="fr-FR" dirty="0" err="1"/>
-              <a:t>Othelloboard</a:t>
-            </a:r>
-            <a:r>
-              <a:rPr lang="fr-FR" dirty="0"/>
-              <a:t>();</a:t>
-            </a:r>
-          </a:p>
-          <a:p>
-            <a:r>
-              <a:rPr lang="fr-FR" dirty="0"/>
-              <a:t>            </a:t>
-            </a:r>
-            <a:r>
-              <a:rPr lang="fr-FR" dirty="0" err="1"/>
-              <a:t>Friend</a:t>
-            </a:r>
-            <a:r>
-              <a:rPr lang="fr-FR" dirty="0"/>
-              <a:t> </a:t>
-            </a:r>
-            <a:r>
-              <a:rPr lang="fr-FR" dirty="0" err="1"/>
-              <a:t>bool</a:t>
-            </a:r>
-            <a:r>
-              <a:rPr lang="fr-FR" dirty="0"/>
-              <a:t> </a:t>
-            </a:r>
-            <a:r>
-              <a:rPr lang="fr-FR" dirty="0" err="1"/>
-              <a:t>mouvement_permis</a:t>
-            </a:r>
-            <a:r>
-              <a:rPr lang="fr-FR" dirty="0"/>
-              <a:t>();</a:t>
-            </a:r>
-          </a:p>
-          <a:p>
-            <a:r>
-              <a:rPr lang="fr-FR" dirty="0"/>
-              <a:t>            </a:t>
-            </a:r>
-            <a:r>
-              <a:rPr lang="fr-FR" dirty="0" err="1"/>
-              <a:t>void</a:t>
-            </a:r>
-            <a:r>
-              <a:rPr lang="fr-FR" dirty="0"/>
-              <a:t> </a:t>
-            </a:r>
-            <a:r>
-              <a:rPr lang="fr-FR" dirty="0" err="1"/>
-              <a:t>tourner_piece</a:t>
-            </a:r>
-            <a:r>
-              <a:rPr lang="fr-FR" dirty="0"/>
-              <a:t>();</a:t>
-            </a:r>
-          </a:p>
-          <a:p>
-            <a:r>
-              <a:rPr lang="fr-FR" dirty="0"/>
-              <a:t>            </a:t>
-            </a:r>
-            <a:r>
-              <a:rPr lang="fr-FR" dirty="0" err="1"/>
-              <a:t>Friend</a:t>
-            </a:r>
-            <a:r>
-              <a:rPr lang="fr-FR" dirty="0"/>
-              <a:t> </a:t>
-            </a:r>
-            <a:r>
-              <a:rPr lang="fr-FR" dirty="0" err="1"/>
-              <a:t>void</a:t>
-            </a:r>
-            <a:r>
-              <a:rPr lang="fr-FR" dirty="0"/>
-              <a:t> blocage();</a:t>
-            </a:r>
-          </a:p>
-          <a:p>
-            <a:r>
-              <a:rPr lang="fr-FR" dirty="0"/>
-              <a:t>            </a:t>
-            </a:r>
-            <a:r>
-              <a:rPr lang="fr-FR" dirty="0" err="1"/>
-              <a:t>Bool</a:t>
-            </a:r>
-            <a:r>
-              <a:rPr lang="fr-FR" dirty="0"/>
-              <a:t> </a:t>
-            </a:r>
-            <a:r>
-              <a:rPr lang="fr-FR" dirty="0" err="1"/>
-              <a:t>jeu_terminé</a:t>
-            </a:r>
-            <a:r>
-              <a:rPr lang="fr-FR" dirty="0" smtClean="0"/>
-              <a:t>(); // les deux joueurs bloqués ou il y’a un seul couleur sur la table </a:t>
-            </a:r>
-            <a:endParaRPr lang="fr-FR" dirty="0"/>
-          </a:p>
-          <a:p>
-            <a:r>
-              <a:rPr lang="fr-FR" dirty="0"/>
-              <a:t>            Player gagnant();</a:t>
-            </a:r>
-          </a:p>
-          <a:p>
-            <a:endParaRPr lang="fr-FR" dirty="0"/>
-          </a:p>
-        </p:txBody>
-      </p:sp>
-    </p:spTree>
-    <p:extLst>
-      <p:ext uri="{BB962C8B-B14F-4D97-AF65-F5344CB8AC3E}">
-        <p14:creationId xmlns:p14="http://schemas.microsoft.com/office/powerpoint/2010/main" val="1576491551"/>
-      </p:ext>
-    </p:extLst>
-  </p:cSld>
-  <p:clrMapOvr>
-    <a:masterClrMapping/>
-  </p:clrMapOvr>
-  <p:timing>
-    <p:tnLst>
-      <p:par>
-        <p:cTn id="1" dur="indefinite" restart="never" nodeType="tmRoot">
-          <p:childTnLst>
-            <p:seq concurrent="1" nextAc="seek">
-              <p:cTn id="2" dur="indefinite" nodeType="mainSeq">
-                <p:childTnLst>
-                  <p:par>
-                    <p:cTn id="3" fill="hold">
-                      <p:stCondLst>
-                        <p:cond delay="indefinite"/>
-                      </p:stCondLst>
-                      <p:childTnLst>
-                        <p:par>
-                          <p:cTn id="4" fill="hold">
-                            <p:stCondLst>
-                              <p:cond delay="0"/>
-                            </p:stCondLst>
-                            <p:childTnLst>
-                              <p:par>
-                                <p:cTn id="5" presetID="22" presetClass="entr" presetSubtype="4" fill="hold" grpId="0" nodeType="clickEffect">
-                                  <p:stCondLst>
-                                    <p:cond delay="0"/>
-                                  </p:stCondLst>
-                                  <p:childTnLst>
-                                    <p:set>
-                                      <p:cBhvr>
-                                        <p:cTn id="6" dur="1" fill="hold">
-                                          <p:stCondLst>
-                                            <p:cond delay="0"/>
-                                          </p:stCondLst>
-                                        </p:cTn>
-                                        <p:tgtEl>
-                                          <p:spTgt spid="2"/>
-                                        </p:tgtEl>
-                                        <p:attrNameLst>
-                                          <p:attrName>style.visibility</p:attrName>
-                                        </p:attrNameLst>
-                                      </p:cBhvr>
-                                      <p:to>
-                                        <p:strVal val="visible"/>
-                                      </p:to>
-                                    </p:set>
-                                    <p:animEffect transition="in" filter="wipe(down)">
-                                      <p:cBhvr>
-                                        <p:cTn id="7" dur="500"/>
-                                        <p:tgtEl>
-                                          <p:spTgt spid="2"/>
-                                        </p:tgtEl>
-                                      </p:cBhvr>
-                                    </p:animEffect>
-                                  </p:childTnLst>
-                                </p:cTn>
-                              </p:par>
-                            </p:childTnLst>
-                          </p:cTn>
-                        </p:par>
-                      </p:childTnLst>
-                    </p:cTn>
-                  </p:par>
-                  <p:par>
-                    <p:cTn id="8" fill="hold">
-                      <p:stCondLst>
-                        <p:cond delay="indefinite"/>
-                      </p:stCondLst>
-                      <p:childTnLst>
-                        <p:par>
-                          <p:cTn id="9" fill="hold">
-                            <p:stCondLst>
-                              <p:cond delay="0"/>
-                            </p:stCondLst>
-                            <p:childTnLst>
-                              <p:par>
-                                <p:cTn id="10" presetID="10" presetClass="entr" presetSubtype="0" fill="hold" grpId="0" nodeType="clickEffect">
-                                  <p:stCondLst>
-                                    <p:cond delay="0"/>
-                                  </p:stCondLst>
-                                  <p:childTnLst>
-                                    <p:set>
-                                      <p:cBhvr>
-                                        <p:cTn id="11" dur="1" fill="hold">
-                                          <p:stCondLst>
-                                            <p:cond delay="0"/>
-                                          </p:stCondLst>
-                                        </p:cTn>
-                                        <p:tgtEl>
-                                          <p:spTgt spid="3"/>
-                                        </p:tgtEl>
-                                        <p:attrNameLst>
-                                          <p:attrName>style.visibility</p:attrName>
-                                        </p:attrNameLst>
-                                      </p:cBhvr>
-                                      <p:to>
-                                        <p:strVal val="visible"/>
-                                      </p:to>
-                                    </p:set>
-                                    <p:animEffect transition="in" filter="fade">
-                                      <p:cBhvr>
-                                        <p:cTn id="12" dur="500"/>
-                                        <p:tgtEl>
-                                          <p:spTgt spid="3"/>
-                                        </p:tgtEl>
-                                      </p:cBhvr>
-                                    </p:animEffect>
-                                  </p:childTnLst>
-                                </p:cTn>
-                              </p:par>
-                            </p:childTnLst>
-                          </p:cTn>
-                        </p:par>
-                      </p:childTnLst>
-                    </p:cTn>
-                  </p:par>
-                </p:childTnLst>
-              </p:cTn>
-              <p:prevCondLst>
-                <p:cond evt="onPrev" delay="0">
-                  <p:tgtEl>
-                    <p:sldTgt/>
-                  </p:tgtEl>
-                </p:cond>
-              </p:prevCondLst>
-              <p:nextCondLst>
-                <p:cond evt="onNext" delay="0">
-                  <p:tgtEl>
-                    <p:sldTgt/>
-                  </p:tgtEl>
-                </p:cond>
-              </p:nextCondLst>
-            </p:seq>
-          </p:childTnLst>
-        </p:cTn>
-      </p:par>
-    </p:tnLst>
-    <p:bldLst>
-      <p:bldP spid="2" grpId="0"/>
-      <p:bldP spid="3" grpId="0"/>
-    </p:bldLst>
-  </p:timing>
-</p:sld>
-</file>
-
-<file path=ppt/slides/slide13.xml><?xml version="1.0" encoding="utf-8"?>
-<p:sld xmlns:a="http://schemas.openxmlformats.org/drawingml/2006/main" xmlns:r="http://schemas.openxmlformats.org/officeDocument/2006/relationships" xmlns:p="http://schemas.openxmlformats.org/presentationml/2006/main">
-  <p:cSld>
-    <p:spTree>
-      <p:nvGrpSpPr>
-        <p:cNvPr id="1" name=""/>
-        <p:cNvGrpSpPr/>
-        <p:nvPr/>
-      </p:nvGrpSpPr>
-      <p:grpSpPr>
-        <a:xfrm>
-          <a:off x="0" y="0"/>
-          <a:ext cx="0" cy="0"/>
-          <a:chOff x="0" y="0"/>
-          <a:chExt cx="0" cy="0"/>
-        </a:xfrm>
-      </p:grpSpPr>
-      <p:sp>
-        <p:nvSpPr>
-          <p:cNvPr id="2" name="Titre 1">
-            <a:extLst>
-              <a:ext uri="{FF2B5EF4-FFF2-40B4-BE49-F238E27FC236}">
-                <a16:creationId xmlns="" xmlns:a16="http://schemas.microsoft.com/office/drawing/2014/main" id="{8F8ED102-DB70-4795-8F34-9EE6F6978AAE}"/>
-              </a:ext>
-            </a:extLst>
-          </p:cNvPr>
-          <p:cNvSpPr>
-            <a:spLocks noGrp="1"/>
-          </p:cNvSpPr>
-          <p:nvPr>
-            <p:ph type="title"/>
-          </p:nvPr>
-        </p:nvSpPr>
-        <p:spPr/>
-        <p:txBody>
-          <a:bodyPr/>
-          <a:lstStyle/>
-          <a:p>
-            <a:pPr algn="ctr"/>
-            <a:r>
-              <a:rPr lang="fr-FR" dirty="0"/>
-              <a:t>Les classes, les méthodes </a:t>
-            </a:r>
-            <a:br>
-              <a:rPr lang="fr-FR" dirty="0"/>
-            </a:br>
-            <a:r>
-              <a:rPr lang="fr-FR" dirty="0"/>
-              <a:t>et les attributs</a:t>
-            </a:r>
-          </a:p>
-        </p:txBody>
-      </p:sp>
-      <p:sp>
-        <p:nvSpPr>
-          <p:cNvPr id="3" name="ZoneTexte 2">
-            <a:extLst>
-              <a:ext uri="{FF2B5EF4-FFF2-40B4-BE49-F238E27FC236}">
-                <a16:creationId xmlns="" xmlns:a16="http://schemas.microsoft.com/office/drawing/2014/main" id="{33F8762C-9F81-40CC-84C9-097B610492BB}"/>
-              </a:ext>
-            </a:extLst>
-          </p:cNvPr>
-          <p:cNvSpPr txBox="1"/>
-          <p:nvPr/>
-        </p:nvSpPr>
-        <p:spPr>
-          <a:xfrm>
-            <a:off x="1957277" y="1951296"/>
-            <a:ext cx="8820150" cy="5632311"/>
-          </a:xfrm>
-          <a:prstGeom prst="rect">
-            <a:avLst/>
-          </a:prstGeom>
-          <a:noFill/>
-        </p:spPr>
-        <p:txBody>
-          <a:bodyPr rot="0" spcFirstLastPara="0" vertOverflow="overflow" horzOverflow="overflow" vert="horz" wrap="square" lIns="91440" tIns="45720" rIns="91440" bIns="45720" numCol="1" spcCol="0" rtlCol="0" fromWordArt="0" anchor="t" anchorCtr="0" forceAA="0" compatLnSpc="1">
-            <a:prstTxWarp prst="textNoShape">
-              <a:avLst/>
-            </a:prstTxWarp>
-            <a:spAutoFit/>
-          </a:bodyPr>
-          <a:lstStyle/>
-          <a:p>
-            <a:endParaRPr lang="fr-FR" dirty="0"/>
-          </a:p>
-          <a:p>
-            <a:r>
-              <a:rPr lang="fr-FR" b="1" dirty="0"/>
-              <a:t>-Player: </a:t>
-            </a:r>
-          </a:p>
-          <a:p>
-            <a:r>
-              <a:rPr lang="fr-FR" dirty="0"/>
-              <a:t>     Attributs:</a:t>
-            </a:r>
-          </a:p>
-          <a:p>
-            <a:r>
-              <a:rPr lang="fr-FR" dirty="0"/>
-              <a:t>            String couleur;</a:t>
-            </a:r>
-          </a:p>
-          <a:p>
-            <a:r>
-              <a:rPr lang="fr-FR" dirty="0"/>
-              <a:t>            Int score;</a:t>
-            </a:r>
-          </a:p>
-          <a:p>
-            <a:r>
-              <a:rPr lang="fr-FR" dirty="0"/>
-              <a:t>     Méthodes:</a:t>
-            </a:r>
-          </a:p>
-          <a:p>
-            <a:r>
-              <a:rPr lang="fr-FR" dirty="0"/>
-              <a:t>            Player();</a:t>
-            </a:r>
-          </a:p>
-          <a:p>
-            <a:r>
-              <a:rPr lang="fr-FR" dirty="0"/>
-              <a:t>            ~Player();</a:t>
-            </a:r>
-          </a:p>
-          <a:p>
-            <a:r>
-              <a:rPr lang="fr-FR" dirty="0"/>
-              <a:t>            </a:t>
-            </a:r>
-            <a:r>
-              <a:rPr lang="fr-FR" dirty="0" smtClean="0"/>
-              <a:t>string </a:t>
-            </a:r>
-            <a:r>
-              <a:rPr lang="fr-FR" dirty="0" err="1"/>
-              <a:t>getColor</a:t>
-            </a:r>
-            <a:r>
-              <a:rPr lang="fr-FR" dirty="0" smtClean="0"/>
-              <a:t>();</a:t>
-            </a:r>
-          </a:p>
-          <a:p>
-            <a:r>
-              <a:rPr lang="fr-FR" dirty="0"/>
-              <a:t>	 </a:t>
-            </a:r>
-            <a:r>
-              <a:rPr lang="fr-FR" dirty="0" smtClean="0"/>
-              <a:t>   </a:t>
-            </a:r>
-            <a:r>
-              <a:rPr lang="fr-FR" dirty="0" err="1" smtClean="0"/>
-              <a:t>int</a:t>
-            </a:r>
-            <a:r>
-              <a:rPr lang="fr-FR" dirty="0" smtClean="0"/>
-              <a:t> </a:t>
-            </a:r>
-            <a:r>
-              <a:rPr lang="fr-FR" dirty="0" err="1" smtClean="0"/>
-              <a:t>getScore</a:t>
-            </a:r>
-            <a:r>
-              <a:rPr lang="fr-FR" dirty="0" smtClean="0"/>
-              <a:t>();</a:t>
-            </a:r>
-          </a:p>
-          <a:p>
-            <a:r>
-              <a:rPr lang="fr-FR" dirty="0"/>
-              <a:t>	</a:t>
-            </a:r>
-            <a:r>
-              <a:rPr lang="fr-FR" dirty="0" smtClean="0"/>
-              <a:t>    </a:t>
-            </a:r>
-            <a:r>
-              <a:rPr lang="fr-FR" dirty="0" err="1" smtClean="0"/>
-              <a:t>void</a:t>
-            </a:r>
-            <a:r>
-              <a:rPr lang="fr-FR" dirty="0" smtClean="0"/>
-              <a:t> </a:t>
-            </a:r>
-            <a:r>
-              <a:rPr lang="fr-FR" dirty="0" err="1" smtClean="0"/>
-              <a:t>setScore</a:t>
-            </a:r>
-            <a:r>
-              <a:rPr lang="fr-FR" dirty="0" smtClean="0"/>
-              <a:t>(</a:t>
-            </a:r>
-            <a:r>
-              <a:rPr lang="fr-FR" dirty="0" err="1" smtClean="0"/>
-              <a:t>int</a:t>
-            </a:r>
-            <a:r>
-              <a:rPr lang="fr-FR" smtClean="0"/>
-              <a:t> score</a:t>
-            </a:r>
-            <a:r>
-              <a:rPr lang="fr-FR" dirty="0" smtClean="0"/>
-              <a:t>);</a:t>
-            </a:r>
-          </a:p>
-          <a:p>
-            <a:r>
-              <a:rPr lang="fr-FR" dirty="0"/>
-              <a:t>	</a:t>
-            </a:r>
-            <a:r>
-              <a:rPr lang="fr-FR" dirty="0" smtClean="0"/>
-              <a:t>    </a:t>
-            </a:r>
-            <a:r>
-              <a:rPr lang="fr-FR" dirty="0" err="1" smtClean="0"/>
-              <a:t>void</a:t>
-            </a:r>
-            <a:r>
-              <a:rPr lang="fr-FR" dirty="0"/>
-              <a:t> </a:t>
-            </a:r>
-            <a:r>
-              <a:rPr lang="fr-FR" dirty="0" smtClean="0"/>
-              <a:t>Afficher();</a:t>
-            </a:r>
-          </a:p>
-          <a:p>
-            <a:r>
-              <a:rPr lang="fr-FR" dirty="0"/>
-              <a:t>	</a:t>
-            </a:r>
-            <a:r>
-              <a:rPr lang="fr-FR" dirty="0" smtClean="0"/>
-              <a:t>    </a:t>
-            </a:r>
-            <a:r>
-              <a:rPr lang="fr-FR" dirty="0" err="1" smtClean="0"/>
-              <a:t>void</a:t>
-            </a:r>
-            <a:r>
-              <a:rPr lang="fr-FR" dirty="0" smtClean="0"/>
-              <a:t> choisir();</a:t>
-            </a:r>
-            <a:endParaRPr lang="fr-FR" dirty="0"/>
-          </a:p>
-          <a:p>
-            <a:r>
-              <a:rPr lang="fr-FR" dirty="0"/>
-              <a:t>            </a:t>
-            </a:r>
-            <a:r>
-              <a:rPr lang="fr-FR" dirty="0" err="1" smtClean="0"/>
-              <a:t>void</a:t>
-            </a:r>
-            <a:r>
-              <a:rPr lang="fr-FR" dirty="0" smtClean="0"/>
-              <a:t> </a:t>
-            </a:r>
-            <a:r>
-              <a:rPr lang="fr-FR" dirty="0"/>
-              <a:t>move();</a:t>
-            </a:r>
-          </a:p>
-          <a:p>
-            <a:r>
-              <a:rPr lang="fr-FR" dirty="0"/>
-              <a:t>            </a:t>
-            </a:r>
-            <a:r>
-              <a:rPr lang="fr-FR" dirty="0" err="1"/>
-              <a:t>bool</a:t>
-            </a:r>
-            <a:r>
-              <a:rPr lang="fr-FR" dirty="0"/>
-              <a:t> </a:t>
-            </a:r>
-            <a:r>
-              <a:rPr lang="fr-FR" dirty="0" smtClean="0"/>
-              <a:t>blocage();</a:t>
-            </a:r>
-          </a:p>
-          <a:p>
-            <a:r>
-              <a:rPr lang="fr-FR" dirty="0" smtClean="0"/>
-              <a:t>	    </a:t>
-            </a:r>
-            <a:r>
-              <a:rPr lang="fr-FR" dirty="0" err="1" smtClean="0"/>
-              <a:t>bool</a:t>
-            </a:r>
-            <a:r>
-              <a:rPr lang="fr-FR" dirty="0"/>
-              <a:t> </a:t>
-            </a:r>
-            <a:r>
-              <a:rPr lang="fr-FR" dirty="0" err="1"/>
-              <a:t>mouvement_permis</a:t>
-            </a:r>
-            <a:r>
-              <a:rPr lang="fr-FR" dirty="0" smtClean="0"/>
-              <a:t>();</a:t>
-            </a:r>
-          </a:p>
-          <a:p>
-            <a:r>
-              <a:rPr lang="fr-FR" dirty="0"/>
-              <a:t> </a:t>
-            </a:r>
-            <a:r>
-              <a:rPr lang="fr-FR" dirty="0" smtClean="0"/>
-              <a:t>	    </a:t>
-            </a:r>
-            <a:r>
-              <a:rPr lang="fr-FR" dirty="0" err="1" smtClean="0"/>
-              <a:t>Friend</a:t>
-            </a:r>
-            <a:r>
-              <a:rPr lang="fr-FR" dirty="0" smtClean="0"/>
-              <a:t> </a:t>
-            </a:r>
-            <a:r>
-              <a:rPr lang="fr-FR" dirty="0" err="1" smtClean="0"/>
-              <a:t>Bool</a:t>
-            </a:r>
-            <a:r>
-              <a:rPr lang="fr-FR" dirty="0" smtClean="0"/>
-              <a:t> </a:t>
-            </a:r>
-            <a:r>
-              <a:rPr lang="fr-FR" dirty="0" err="1"/>
-              <a:t>jeu_terminé</a:t>
-            </a:r>
-            <a:r>
-              <a:rPr lang="fr-FR" dirty="0"/>
-              <a:t>();</a:t>
-            </a:r>
-          </a:p>
-          <a:p>
-            <a:endParaRPr lang="fr-FR" dirty="0"/>
-          </a:p>
-          <a:p>
-            <a:endParaRPr lang="fr-FR" dirty="0"/>
-          </a:p>
-          <a:p>
-            <a:r>
-              <a:rPr lang="fr-FR" dirty="0"/>
-              <a:t>            </a:t>
-            </a:r>
-          </a:p>
-        </p:txBody>
-      </p:sp>
-    </p:spTree>
-    <p:extLst>
-      <p:ext uri="{BB962C8B-B14F-4D97-AF65-F5344CB8AC3E}">
-        <p14:creationId xmlns:p14="http://schemas.microsoft.com/office/powerpoint/2010/main" val="2971253204"/>
-      </p:ext>
-    </p:extLst>
-  </p:cSld>
-  <p:clrMapOvr>
-    <a:masterClrMapping/>
-  </p:clrMapOvr>
-  <p:timing>
-    <p:tnLst>
-      <p:par>
-        <p:cTn id="1" dur="indefinite" restart="never" nodeType="tmRoot">
-          <p:childTnLst>
-            <p:seq concurrent="1" nextAc="seek">
-              <p:cTn id="2" dur="indefinite" nodeType="mainSeq">
-                <p:childTnLst>
-                  <p:par>
-                    <p:cTn id="3" fill="hold">
-                      <p:stCondLst>
-                        <p:cond delay="indefinite"/>
-                      </p:stCondLst>
-                      <p:childTnLst>
-                        <p:par>
-                          <p:cTn id="4" fill="hold">
-                            <p:stCondLst>
-                              <p:cond delay="0"/>
-                            </p:stCondLst>
-                            <p:childTnLst>
-                              <p:par>
-                                <p:cTn id="5" presetID="10" presetClass="entr" presetSubtype="0" fill="hold" grpId="0" nodeType="clickEffect">
-                                  <p:stCondLst>
-                                    <p:cond delay="0"/>
-                                  </p:stCondLst>
-                                  <p:childTnLst>
-                                    <p:set>
-                                      <p:cBhvr>
-                                        <p:cTn id="6" dur="1" fill="hold">
-                                          <p:stCondLst>
-                                            <p:cond delay="0"/>
-                                          </p:stCondLst>
-                                        </p:cTn>
-                                        <p:tgtEl>
-                                          <p:spTgt spid="3"/>
-                                        </p:tgtEl>
-                                        <p:attrNameLst>
-                                          <p:attrName>style.visibility</p:attrName>
-                                        </p:attrNameLst>
-                                      </p:cBhvr>
-                                      <p:to>
-                                        <p:strVal val="visible"/>
-                                      </p:to>
-                                    </p:set>
-                                    <p:animEffect transition="in" filter="fade">
-                                      <p:cBhvr>
-                                        <p:cTn id="7" dur="500"/>
-                                        <p:tgtEl>
-                                          <p:spTgt spid="3"/>
-                                        </p:tgtEl>
-                                      </p:cBhvr>
-                                    </p:animEffect>
-                                  </p:childTnLst>
-                                </p:cTn>
-                              </p:par>
-                            </p:childTnLst>
-                          </p:cTn>
-                        </p:par>
-                      </p:childTnLst>
-                    </p:cTn>
-                  </p:par>
-                </p:childTnLst>
-              </p:cTn>
-              <p:prevCondLst>
-                <p:cond evt="onPrev" delay="0">
-                  <p:tgtEl>
-                    <p:sldTgt/>
-                  </p:tgtEl>
-                </p:cond>
-              </p:prevCondLst>
-              <p:nextCondLst>
-                <p:cond evt="onNext" delay="0">
-                  <p:tgtEl>
-                    <p:sldTgt/>
-                  </p:tgtEl>
-                </p:cond>
-              </p:nextCondLst>
-            </p:seq>
-          </p:childTnLst>
-        </p:cTn>
-      </p:par>
-    </p:tnLst>
-    <p:bldLst>
-      <p:bldP spid="3" grpId="0"/>
-    </p:bldLst>
-  </p:timing>
-</p:sld>
-</file>
-
-<file path=ppt/slides/slide14.xml><?xml version="1.0" encoding="utf-8"?>
-<p:sld xmlns:a="http://schemas.openxmlformats.org/drawingml/2006/main" xmlns:r="http://schemas.openxmlformats.org/officeDocument/2006/relationships" xmlns:p="http://schemas.openxmlformats.org/presentationml/2006/main">
-  <p:cSld>
-    <p:spTree>
-      <p:nvGrpSpPr>
-        <p:cNvPr id="1" name=""/>
-        <p:cNvGrpSpPr/>
-        <p:nvPr/>
-      </p:nvGrpSpPr>
-      <p:grpSpPr>
-        <a:xfrm>
-          <a:off x="0" y="0"/>
-          <a:ext cx="0" cy="0"/>
-          <a:chOff x="0" y="0"/>
-          <a:chExt cx="0" cy="0"/>
-        </a:xfrm>
-      </p:grpSpPr>
-      <p:sp>
-        <p:nvSpPr>
-          <p:cNvPr id="2" name="Titre 1"/>
-          <p:cNvSpPr>
-            <a:spLocks noGrp="1"/>
-          </p:cNvSpPr>
-          <p:nvPr>
-            <p:ph type="title"/>
-          </p:nvPr>
-        </p:nvSpPr>
-        <p:spPr>
-          <a:xfrm>
-            <a:off x="1371600" y="225632"/>
-            <a:ext cx="9494321" cy="1413163"/>
-          </a:xfrm>
-        </p:spPr>
-        <p:txBody>
-          <a:bodyPr/>
-          <a:lstStyle/>
-          <a:p>
-            <a:pPr algn="ctr"/>
-            <a:r>
-              <a:rPr lang="fr-FR" dirty="0"/>
-              <a:t>Les classes, les méthodes </a:t>
-            </a:r>
-            <a:br>
-              <a:rPr lang="fr-FR" dirty="0"/>
-            </a:br>
-            <a:r>
-              <a:rPr lang="fr-FR" dirty="0"/>
-              <a:t>et les attributs</a:t>
-            </a:r>
-          </a:p>
-        </p:txBody>
-      </p:sp>
-      <p:sp>
-        <p:nvSpPr>
-          <p:cNvPr id="3" name="Espace réservé du contenu 2"/>
-          <p:cNvSpPr>
-            <a:spLocks noGrp="1"/>
-          </p:cNvSpPr>
-          <p:nvPr>
-            <p:ph idx="1"/>
-          </p:nvPr>
-        </p:nvSpPr>
-        <p:spPr>
-          <a:xfrm>
-            <a:off x="1371600" y="1781299"/>
-            <a:ext cx="9601200" cy="4940135"/>
-          </a:xfrm>
-        </p:spPr>
-        <p:txBody>
-          <a:bodyPr/>
-          <a:lstStyle/>
-          <a:p>
-            <a:pPr marL="0" indent="0">
-              <a:buNone/>
-            </a:pPr>
-            <a:r>
-              <a:rPr lang="fr-FR" dirty="0" smtClean="0"/>
-              <a:t>-</a:t>
-            </a:r>
-            <a:r>
-              <a:rPr lang="fr-FR" b="1" dirty="0" smtClean="0"/>
-              <a:t>Case:</a:t>
-            </a:r>
-          </a:p>
-          <a:p>
-            <a:pPr marL="0" indent="0">
-              <a:buNone/>
-            </a:pPr>
-            <a:r>
-              <a:rPr lang="fr-FR" b="1" dirty="0" smtClean="0"/>
-              <a:t>	</a:t>
-            </a:r>
-            <a:r>
-              <a:rPr lang="fr-FR" sz="1800" dirty="0" smtClean="0">
-                <a:latin typeface="Bahnschrift" panose="020B0502040204020203" pitchFamily="34" charset="0"/>
-              </a:rPr>
-              <a:t>Attributs :</a:t>
-            </a:r>
-            <a:endParaRPr lang="fr-FR" dirty="0" smtClean="0">
-              <a:latin typeface="Bahnschrift" panose="020B0502040204020203" pitchFamily="34" charset="0"/>
-            </a:endParaRPr>
-          </a:p>
-          <a:p>
-            <a:pPr marL="0" indent="0">
-              <a:buNone/>
-            </a:pPr>
-            <a:r>
-              <a:rPr lang="fr-FR" b="1" dirty="0"/>
-              <a:t>	</a:t>
-            </a:r>
-            <a:r>
-              <a:rPr lang="fr-FR" b="1" dirty="0" smtClean="0"/>
-              <a:t>     </a:t>
-            </a:r>
-            <a:r>
-              <a:rPr lang="fr-FR" sz="1600" dirty="0" err="1" smtClean="0">
-                <a:latin typeface="Arial Rounded MT Bold" panose="020F0704030504030204" pitchFamily="34" charset="0"/>
-              </a:rPr>
-              <a:t>int</a:t>
-            </a:r>
-            <a:r>
-              <a:rPr lang="fr-FR" sz="1600" dirty="0" smtClean="0">
-                <a:latin typeface="Arial Rounded MT Bold" panose="020F0704030504030204" pitchFamily="34" charset="0"/>
-              </a:rPr>
-              <a:t> ligne ;</a:t>
-            </a:r>
-          </a:p>
-          <a:p>
-            <a:pPr marL="0" indent="0">
-              <a:buNone/>
-            </a:pPr>
-            <a:r>
-              <a:rPr lang="fr-FR" sz="1600" dirty="0">
-                <a:latin typeface="Arial Rounded MT Bold" panose="020F0704030504030204" pitchFamily="34" charset="0"/>
-              </a:rPr>
-              <a:t>	</a:t>
-            </a:r>
-            <a:r>
-              <a:rPr lang="fr-FR" sz="1600" dirty="0" smtClean="0">
-                <a:latin typeface="Arial Rounded MT Bold" panose="020F0704030504030204" pitchFamily="34" charset="0"/>
-              </a:rPr>
-              <a:t>      </a:t>
-            </a:r>
-            <a:r>
-              <a:rPr lang="fr-FR" sz="1600" dirty="0" err="1" smtClean="0">
-                <a:latin typeface="Arial Rounded MT Bold" panose="020F0704030504030204" pitchFamily="34" charset="0"/>
-              </a:rPr>
-              <a:t>int</a:t>
-            </a:r>
-            <a:r>
-              <a:rPr lang="fr-FR" sz="1600" dirty="0" smtClean="0">
-                <a:latin typeface="Arial Rounded MT Bold" panose="020F0704030504030204" pitchFamily="34" charset="0"/>
-              </a:rPr>
-              <a:t> colonne;</a:t>
-            </a:r>
-          </a:p>
-          <a:p>
-            <a:pPr marL="0" indent="0">
-              <a:buNone/>
-            </a:pPr>
-            <a:r>
-              <a:rPr lang="fr-FR" sz="1600" dirty="0">
-                <a:latin typeface="Arial Rounded MT Bold" panose="020F0704030504030204" pitchFamily="34" charset="0"/>
-              </a:rPr>
-              <a:t>	</a:t>
-            </a:r>
-            <a:r>
-              <a:rPr lang="fr-FR" sz="1800" dirty="0" err="1">
-                <a:latin typeface="Bahnschrift" panose="020B0502040204020203" pitchFamily="34" charset="0"/>
-              </a:rPr>
-              <a:t>Methodes</a:t>
-            </a:r>
-            <a:r>
-              <a:rPr lang="fr-FR" sz="1800" dirty="0">
-                <a:latin typeface="Bahnschrift" panose="020B0502040204020203" pitchFamily="34" charset="0"/>
-              </a:rPr>
-              <a:t> </a:t>
-            </a:r>
-            <a:r>
-              <a:rPr lang="fr-FR" sz="1800" dirty="0" smtClean="0">
-                <a:latin typeface="Bahnschrift" panose="020B0502040204020203" pitchFamily="34" charset="0"/>
-              </a:rPr>
-              <a:t>:</a:t>
-            </a:r>
-          </a:p>
-          <a:p>
-            <a:pPr marL="0" indent="0">
-              <a:buNone/>
-            </a:pPr>
-            <a:r>
-              <a:rPr lang="fr-FR" sz="1800" dirty="0">
-                <a:latin typeface="Bahnschrift" panose="020B0502040204020203" pitchFamily="34" charset="0"/>
-              </a:rPr>
-              <a:t>	</a:t>
-            </a:r>
-            <a:r>
-              <a:rPr lang="fr-FR" sz="1800" dirty="0" smtClean="0">
-                <a:latin typeface="Bahnschrift" panose="020B0502040204020203" pitchFamily="34" charset="0"/>
-              </a:rPr>
-              <a:t>      Case();</a:t>
-            </a:r>
-          </a:p>
-          <a:p>
-            <a:pPr marL="0" indent="0">
-              <a:buNone/>
-            </a:pPr>
-            <a:r>
-              <a:rPr lang="fr-FR" sz="1800" dirty="0">
-                <a:latin typeface="Bahnschrift" panose="020B0502040204020203" pitchFamily="34" charset="0"/>
-              </a:rPr>
-              <a:t>	</a:t>
-            </a:r>
-            <a:r>
-              <a:rPr lang="fr-FR" sz="1800" dirty="0" smtClean="0">
-                <a:latin typeface="Bahnschrift" panose="020B0502040204020203" pitchFamily="34" charset="0"/>
-              </a:rPr>
-              <a:t>      ~Case();</a:t>
-            </a:r>
-          </a:p>
-          <a:p>
-            <a:pPr marL="0" indent="0">
-              <a:buNone/>
-            </a:pPr>
-            <a:r>
-              <a:rPr lang="fr-FR" sz="1800" dirty="0">
-                <a:latin typeface="Bahnschrift" panose="020B0502040204020203" pitchFamily="34" charset="0"/>
-              </a:rPr>
-              <a:t>	</a:t>
-            </a:r>
-            <a:r>
-              <a:rPr lang="fr-FR" sz="1800" dirty="0" smtClean="0">
-                <a:latin typeface="Bahnschrift" panose="020B0502040204020203" pitchFamily="34" charset="0"/>
-              </a:rPr>
-              <a:t>      </a:t>
-            </a:r>
-            <a:r>
-              <a:rPr lang="fr-FR" sz="1800" dirty="0" err="1" smtClean="0">
-                <a:latin typeface="Bahnschrift" panose="020B0502040204020203" pitchFamily="34" charset="0"/>
-              </a:rPr>
-              <a:t>int</a:t>
-            </a:r>
-            <a:r>
-              <a:rPr lang="fr-FR" sz="1800" dirty="0" smtClean="0">
-                <a:latin typeface="Bahnschrift" panose="020B0502040204020203" pitchFamily="34" charset="0"/>
-              </a:rPr>
-              <a:t> </a:t>
-            </a:r>
-            <a:r>
-              <a:rPr lang="fr-FR" sz="1800" dirty="0" err="1" smtClean="0">
-                <a:latin typeface="Bahnschrift" panose="020B0502040204020203" pitchFamily="34" charset="0"/>
-              </a:rPr>
-              <a:t>getLigne</a:t>
-            </a:r>
-            <a:r>
-              <a:rPr lang="fr-FR" sz="1800" dirty="0" smtClean="0">
-                <a:latin typeface="Bahnschrift" panose="020B0502040204020203" pitchFamily="34" charset="0"/>
-              </a:rPr>
-              <a:t>();</a:t>
-            </a:r>
-          </a:p>
-          <a:p>
-            <a:pPr marL="0" indent="0">
-              <a:buNone/>
-            </a:pPr>
-            <a:r>
-              <a:rPr lang="fr-FR" sz="1800" dirty="0">
-                <a:latin typeface="Bahnschrift" panose="020B0502040204020203" pitchFamily="34" charset="0"/>
-              </a:rPr>
-              <a:t>	</a:t>
-            </a:r>
-            <a:r>
-              <a:rPr lang="fr-FR" sz="1800" dirty="0" smtClean="0">
-                <a:latin typeface="Bahnschrift" panose="020B0502040204020203" pitchFamily="34" charset="0"/>
-              </a:rPr>
-              <a:t>      </a:t>
-            </a:r>
-            <a:r>
-              <a:rPr lang="fr-FR" sz="1800" dirty="0" err="1" smtClean="0">
-                <a:latin typeface="Bahnschrift" panose="020B0502040204020203" pitchFamily="34" charset="0"/>
-              </a:rPr>
-              <a:t>int</a:t>
-            </a:r>
-            <a:r>
-              <a:rPr lang="fr-FR" sz="1800" dirty="0" smtClean="0">
-                <a:latin typeface="Bahnschrift" panose="020B0502040204020203" pitchFamily="34" charset="0"/>
-              </a:rPr>
-              <a:t> </a:t>
-            </a:r>
-            <a:r>
-              <a:rPr lang="fr-FR" sz="1800" dirty="0" err="1" smtClean="0">
-                <a:latin typeface="Bahnschrift" panose="020B0502040204020203" pitchFamily="34" charset="0"/>
-              </a:rPr>
-              <a:t>getColonne</a:t>
-            </a:r>
-            <a:r>
-              <a:rPr lang="fr-FR" sz="1800" dirty="0" smtClean="0">
-                <a:latin typeface="Bahnschrift" panose="020B0502040204020203" pitchFamily="34" charset="0"/>
-              </a:rPr>
-              <a:t>();</a:t>
-            </a:r>
-            <a:endParaRPr lang="fr-FR" sz="1800" dirty="0">
-              <a:latin typeface="Bahnschrift" panose="020B0502040204020203" pitchFamily="34" charset="0"/>
-            </a:endParaRPr>
-          </a:p>
-          <a:p>
-            <a:pPr marL="0" indent="0">
-              <a:buNone/>
-            </a:pPr>
-            <a:r>
-              <a:rPr lang="fr-FR" sz="1600" dirty="0" smtClean="0">
-                <a:latin typeface="Arial Rounded MT Bold" panose="020F0704030504030204" pitchFamily="34" charset="0"/>
-              </a:rPr>
-              <a:t>	       </a:t>
-            </a:r>
-            <a:r>
-              <a:rPr lang="fr-FR" sz="1600" dirty="0" err="1" smtClean="0">
-                <a:latin typeface="Arial Rounded MT Bold" panose="020F0704030504030204" pitchFamily="34" charset="0"/>
-              </a:rPr>
-              <a:t>int</a:t>
-            </a:r>
-            <a:r>
-              <a:rPr lang="fr-FR" sz="1600" dirty="0" smtClean="0">
-                <a:latin typeface="Arial Rounded MT Bold" panose="020F0704030504030204" pitchFamily="34" charset="0"/>
-              </a:rPr>
-              <a:t> Value();</a:t>
-            </a:r>
-            <a:endParaRPr lang="fr-FR" sz="1600" dirty="0">
-              <a:latin typeface="Arial Rounded MT Bold" panose="020F0704030504030204" pitchFamily="34" charset="0"/>
-            </a:endParaRPr>
-          </a:p>
-        </p:txBody>
-      </p:sp>
-    </p:spTree>
-    <p:extLst>
-      <p:ext uri="{BB962C8B-B14F-4D97-AF65-F5344CB8AC3E}">
-        <p14:creationId xmlns:p14="http://schemas.microsoft.com/office/powerpoint/2010/main" val="3266503052"/>
-      </p:ext>
-    </p:extLst>
-  </p:cSld>
-  <p:clrMapOvr>
-    <a:masterClrMapping/>
-  </p:clrMapOvr>
-</p:sld>
-</file>
-
-<file path=ppt/slides/slide15.xml><?xml version="1.0" encoding="utf-8"?>
 <p:sld xmlns:a="http://schemas.openxmlformats.org/drawingml/2006/main" xmlns:r="http://schemas.openxmlformats.org/officeDocument/2006/relationships" xmlns:p="http://schemas.openxmlformats.org/presentationml/2006/main">
   <p:cSld>
     <p:spTree>
@@ -6970,6 +5677,2263 @@
 </p:sld>
 </file>
 
+<file path=ppt/slides/slide13.xml><?xml version="1.0" encoding="utf-8"?>
+<p:sld xmlns:a="http://schemas.openxmlformats.org/drawingml/2006/main" xmlns:r="http://schemas.openxmlformats.org/officeDocument/2006/relationships" xmlns:p="http://schemas.openxmlformats.org/presentationml/2006/main">
+  <p:cSld>
+    <p:spTree>
+      <p:nvGrpSpPr>
+        <p:cNvPr id="1" name=""/>
+        <p:cNvGrpSpPr/>
+        <p:nvPr/>
+      </p:nvGrpSpPr>
+      <p:grpSpPr>
+        <a:xfrm>
+          <a:off x="0" y="0"/>
+          <a:ext cx="0" cy="0"/>
+          <a:chOff x="0" y="0"/>
+          <a:chExt cx="0" cy="0"/>
+        </a:xfrm>
+      </p:grpSpPr>
+      <p:sp>
+        <p:nvSpPr>
+          <p:cNvPr id="2" name="Titre 1">
+            <a:extLst>
+              <a:ext uri="{FF2B5EF4-FFF2-40B4-BE49-F238E27FC236}">
+                <a16:creationId xmlns="" xmlns:a16="http://schemas.microsoft.com/office/drawing/2014/main" id="{8F8ED102-DB70-4795-8F34-9EE6F6978AAE}"/>
+              </a:ext>
+            </a:extLst>
+          </p:cNvPr>
+          <p:cNvSpPr>
+            <a:spLocks noGrp="1"/>
+          </p:cNvSpPr>
+          <p:nvPr>
+            <p:ph type="title"/>
+          </p:nvPr>
+        </p:nvSpPr>
+        <p:spPr/>
+        <p:txBody>
+          <a:bodyPr/>
+          <a:lstStyle/>
+          <a:p>
+            <a:pPr algn="ctr"/>
+            <a:r>
+              <a:rPr lang="fr-FR" dirty="0"/>
+              <a:t>Les classes, les méthodes </a:t>
+            </a:r>
+            <a:br>
+              <a:rPr lang="fr-FR" dirty="0"/>
+            </a:br>
+            <a:r>
+              <a:rPr lang="fr-FR" dirty="0"/>
+              <a:t>et les attributs</a:t>
+            </a:r>
+          </a:p>
+        </p:txBody>
+      </p:sp>
+      <p:sp>
+        <p:nvSpPr>
+          <p:cNvPr id="3" name="ZoneTexte 2">
+            <a:extLst>
+              <a:ext uri="{FF2B5EF4-FFF2-40B4-BE49-F238E27FC236}">
+                <a16:creationId xmlns="" xmlns:a16="http://schemas.microsoft.com/office/drawing/2014/main" id="{33F8762C-9F81-40CC-84C9-097B610492BB}"/>
+              </a:ext>
+            </a:extLst>
+          </p:cNvPr>
+          <p:cNvSpPr txBox="1"/>
+          <p:nvPr/>
+        </p:nvSpPr>
+        <p:spPr>
+          <a:xfrm>
+            <a:off x="1762125" y="2105907"/>
+            <a:ext cx="8820150" cy="4062651"/>
+          </a:xfrm>
+          <a:prstGeom prst="rect">
+            <a:avLst/>
+          </a:prstGeom>
+          <a:noFill/>
+        </p:spPr>
+        <p:txBody>
+          <a:bodyPr rot="0" spcFirstLastPara="0" vertOverflow="overflow" horzOverflow="overflow" vert="horz" wrap="square" lIns="91440" tIns="45720" rIns="91440" bIns="45720" numCol="1" spcCol="0" rtlCol="0" fromWordArt="0" anchor="t" anchorCtr="0" forceAA="0" compatLnSpc="1">
+            <a:prstTxWarp prst="textNoShape">
+              <a:avLst/>
+            </a:prstTxWarp>
+            <a:spAutoFit/>
+          </a:bodyPr>
+          <a:lstStyle/>
+          <a:p>
+            <a:endParaRPr lang="fr-FR" sz="2400" b="1" dirty="0">
+              <a:solidFill>
+                <a:schemeClr val="bg2">
+                  <a:lumMod val="50000"/>
+                </a:schemeClr>
+              </a:solidFill>
+            </a:endParaRPr>
+          </a:p>
+          <a:p>
+            <a:endParaRPr lang="fr-FR" b="1" dirty="0"/>
+          </a:p>
+          <a:p>
+            <a:r>
+              <a:rPr lang="fr-FR" b="1" dirty="0"/>
+              <a:t>     </a:t>
+            </a:r>
+            <a:r>
+              <a:rPr lang="fr-FR" b="1" dirty="0" err="1"/>
+              <a:t>Private</a:t>
+            </a:r>
+            <a:r>
+              <a:rPr lang="fr-FR" b="1" dirty="0"/>
+              <a:t>:</a:t>
+            </a:r>
+          </a:p>
+          <a:p>
+            <a:endParaRPr lang="fr-FR" dirty="0"/>
+          </a:p>
+          <a:p>
+            <a:r>
+              <a:rPr lang="fr-FR" dirty="0"/>
+              <a:t>            Char </a:t>
+            </a:r>
+            <a:r>
+              <a:rPr lang="fr-FR" dirty="0" err="1"/>
+              <a:t>board</a:t>
+            </a:r>
+            <a:r>
+              <a:rPr lang="fr-FR" dirty="0"/>
+              <a:t>[8][8]; </a:t>
+            </a:r>
+            <a:r>
+              <a:rPr lang="fr-FR" sz="1200" dirty="0"/>
+              <a:t>//position tableau</a:t>
+            </a:r>
+          </a:p>
+          <a:p>
+            <a:r>
+              <a:rPr lang="fr-FR" dirty="0"/>
+              <a:t>            Char </a:t>
+            </a:r>
+            <a:r>
+              <a:rPr lang="fr-FR" dirty="0" err="1"/>
+              <a:t>lboard</a:t>
+            </a:r>
+            <a:r>
+              <a:rPr lang="fr-FR" dirty="0"/>
+              <a:t>[8][8]; </a:t>
+            </a:r>
+            <a:r>
+              <a:rPr lang="fr-FR" sz="1200" dirty="0"/>
+              <a:t>//positions légales</a:t>
+            </a:r>
+            <a:endParaRPr lang="fr-FR" sz="1200" dirty="0">
+              <a:ea typeface="+mn-lt"/>
+              <a:cs typeface="+mn-lt"/>
+            </a:endParaRPr>
+          </a:p>
+          <a:p>
+            <a:r>
+              <a:rPr lang="fr-FR" dirty="0"/>
+              <a:t>            Int </a:t>
+            </a:r>
+            <a:r>
+              <a:rPr lang="fr-FR" dirty="0" err="1" smtClean="0"/>
+              <a:t>score_noir</a:t>
+            </a:r>
+            <a:r>
+              <a:rPr lang="fr-FR" dirty="0" smtClean="0"/>
+              <a:t>; </a:t>
+            </a:r>
+            <a:endParaRPr lang="fr-FR" dirty="0"/>
+          </a:p>
+          <a:p>
+            <a:r>
+              <a:rPr lang="fr-FR" dirty="0"/>
+              <a:t>            Int </a:t>
+            </a:r>
+            <a:r>
+              <a:rPr lang="fr-FR" dirty="0" err="1" smtClean="0"/>
+              <a:t>score_blanc</a:t>
+            </a:r>
+            <a:r>
+              <a:rPr lang="fr-FR" dirty="0" smtClean="0"/>
+              <a:t>;</a:t>
+            </a:r>
+            <a:endParaRPr lang="fr-FR" dirty="0"/>
+          </a:p>
+          <a:p>
+            <a:r>
+              <a:rPr lang="fr-FR" dirty="0"/>
+              <a:t>            </a:t>
+            </a:r>
+            <a:r>
+              <a:rPr lang="fr-FR" dirty="0" err="1"/>
+              <a:t>Bool</a:t>
+            </a:r>
+            <a:r>
+              <a:rPr lang="fr-FR" dirty="0"/>
+              <a:t> </a:t>
+            </a:r>
+            <a:r>
+              <a:rPr lang="fr-FR" dirty="0" err="1" smtClean="0"/>
+              <a:t>finished</a:t>
+            </a:r>
+            <a:r>
+              <a:rPr lang="fr-FR" dirty="0" smtClean="0"/>
+              <a:t>; </a:t>
+            </a:r>
+            <a:r>
+              <a:rPr lang="fr-FR" sz="1200" dirty="0"/>
+              <a:t>// affiche si la partie terminée</a:t>
+            </a:r>
+          </a:p>
+          <a:p>
+            <a:r>
+              <a:rPr lang="fr-FR" dirty="0"/>
+              <a:t>            Char </a:t>
+            </a:r>
+            <a:r>
+              <a:rPr lang="fr-FR" dirty="0" err="1" smtClean="0"/>
+              <a:t>turn</a:t>
+            </a:r>
+            <a:r>
+              <a:rPr lang="fr-FR" dirty="0" smtClean="0"/>
+              <a:t>; </a:t>
+            </a:r>
+            <a:r>
+              <a:rPr lang="fr-FR" sz="1200" dirty="0"/>
+              <a:t>// tour du joueur</a:t>
+            </a:r>
+          </a:p>
+          <a:p>
+            <a:r>
+              <a:rPr lang="fr-FR" dirty="0"/>
+              <a:t>             Int </a:t>
+            </a:r>
+            <a:r>
+              <a:rPr lang="fr-FR" dirty="0" err="1" smtClean="0"/>
+              <a:t>nblegalmoves</a:t>
+            </a:r>
+            <a:r>
+              <a:rPr lang="fr-FR" dirty="0" smtClean="0"/>
+              <a:t>;</a:t>
+            </a:r>
+            <a:endParaRPr lang="fr-FR" dirty="0"/>
+          </a:p>
+          <a:p>
+            <a:endParaRPr lang="fr-FR" dirty="0"/>
+          </a:p>
+          <a:p>
+            <a:r>
+              <a:rPr lang="fr-FR" dirty="0"/>
+              <a:t>     </a:t>
+            </a:r>
+          </a:p>
+          <a:p>
+            <a:endParaRPr lang="fr-FR" dirty="0"/>
+          </a:p>
+        </p:txBody>
+      </p:sp>
+      <p:sp>
+        <p:nvSpPr>
+          <p:cNvPr id="4" name="ZoneTexte 3">
+            <a:extLst>
+              <a:ext uri="{FF2B5EF4-FFF2-40B4-BE49-F238E27FC236}">
+                <a16:creationId xmlns="" xmlns:a16="http://schemas.microsoft.com/office/drawing/2014/main" id="{5AF21162-9438-427E-A62F-F932051225C8}"/>
+              </a:ext>
+            </a:extLst>
+          </p:cNvPr>
+          <p:cNvSpPr txBox="1"/>
+          <p:nvPr/>
+        </p:nvSpPr>
+        <p:spPr>
+          <a:xfrm>
+            <a:off x="6172200" y="2747527"/>
+            <a:ext cx="5862083" cy="4247317"/>
+          </a:xfrm>
+          <a:prstGeom prst="rect">
+            <a:avLst/>
+          </a:prstGeom>
+          <a:noFill/>
+        </p:spPr>
+        <p:txBody>
+          <a:bodyPr rot="0" spcFirstLastPara="0" vertOverflow="overflow" horzOverflow="overflow" vert="horz" wrap="square" lIns="91440" tIns="45720" rIns="91440" bIns="45720" numCol="1" spcCol="0" rtlCol="0" fromWordArt="0" anchor="t" anchorCtr="0" forceAA="0" compatLnSpc="1">
+            <a:prstTxWarp prst="textNoShape">
+              <a:avLst/>
+            </a:prstTxWarp>
+            <a:spAutoFit/>
+          </a:bodyPr>
+          <a:lstStyle/>
+          <a:p>
+            <a:r>
+              <a:rPr lang="fr-FR" b="1" dirty="0">
+                <a:ea typeface="+mn-lt"/>
+                <a:cs typeface="+mn-lt"/>
+              </a:rPr>
+              <a:t>Public:</a:t>
+            </a:r>
+          </a:p>
+          <a:p>
+            <a:endParaRPr lang="fr-FR" b="1" dirty="0">
+              <a:ea typeface="+mn-lt"/>
+              <a:cs typeface="+mn-lt"/>
+            </a:endParaRPr>
+          </a:p>
+          <a:p>
+            <a:r>
+              <a:rPr lang="fr-FR" dirty="0" err="1">
+                <a:ea typeface="+mn-lt"/>
+                <a:cs typeface="+mn-lt"/>
+              </a:rPr>
+              <a:t>Othelloboard</a:t>
+            </a:r>
+            <a:r>
+              <a:rPr lang="fr-FR" dirty="0">
+                <a:ea typeface="+mn-lt"/>
+                <a:cs typeface="+mn-lt"/>
+              </a:rPr>
+              <a:t>(); </a:t>
+            </a:r>
+            <a:r>
+              <a:rPr lang="fr-FR" sz="1200" dirty="0">
+                <a:ea typeface="+mn-lt"/>
+                <a:cs typeface="+mn-lt"/>
+              </a:rPr>
+              <a:t>// constructeur</a:t>
+            </a:r>
+            <a:endParaRPr lang="en-US" dirty="0">
+              <a:ea typeface="+mn-lt"/>
+              <a:cs typeface="+mn-lt"/>
+            </a:endParaRPr>
+          </a:p>
+          <a:p>
+            <a:r>
+              <a:rPr lang="fr-FR" dirty="0">
+                <a:ea typeface="+mn-lt"/>
+                <a:cs typeface="+mn-lt"/>
+              </a:rPr>
+              <a:t>~</a:t>
+            </a:r>
+            <a:r>
+              <a:rPr lang="fr-FR" dirty="0" err="1">
+                <a:ea typeface="+mn-lt"/>
+                <a:cs typeface="+mn-lt"/>
+              </a:rPr>
+              <a:t>Othelloboard</a:t>
+            </a:r>
+            <a:r>
+              <a:rPr lang="fr-FR" dirty="0">
+                <a:ea typeface="+mn-lt"/>
+                <a:cs typeface="+mn-lt"/>
+              </a:rPr>
+              <a:t>(); </a:t>
+            </a:r>
+            <a:r>
+              <a:rPr lang="fr-FR" sz="1200" dirty="0">
+                <a:ea typeface="+mn-lt"/>
+                <a:cs typeface="+mn-lt"/>
+              </a:rPr>
+              <a:t>// destructeur</a:t>
+            </a:r>
+            <a:endParaRPr lang="en-US" sz="1200" dirty="0">
+              <a:ea typeface="+mn-lt"/>
+              <a:cs typeface="+mn-lt"/>
+            </a:endParaRPr>
+          </a:p>
+          <a:p>
+            <a:r>
+              <a:rPr lang="fr-FR" dirty="0" err="1">
+                <a:ea typeface="+mn-lt"/>
+                <a:cs typeface="+mn-lt"/>
+              </a:rPr>
+              <a:t>Void</a:t>
+            </a:r>
+            <a:r>
+              <a:rPr lang="fr-FR" dirty="0">
+                <a:ea typeface="+mn-lt"/>
+                <a:cs typeface="+mn-lt"/>
+              </a:rPr>
+              <a:t> </a:t>
+            </a:r>
+            <a:r>
+              <a:rPr lang="fr-FR" dirty="0" err="1">
+                <a:ea typeface="+mn-lt"/>
+                <a:cs typeface="+mn-lt"/>
+              </a:rPr>
+              <a:t>passe_tour</a:t>
+            </a:r>
+            <a:r>
+              <a:rPr lang="fr-FR" dirty="0">
+                <a:ea typeface="+mn-lt"/>
+                <a:cs typeface="+mn-lt"/>
+              </a:rPr>
+              <a:t>(); </a:t>
+            </a:r>
+            <a:r>
+              <a:rPr lang="fr-FR" sz="1200" dirty="0">
+                <a:ea typeface="+mn-lt"/>
+                <a:cs typeface="+mn-lt"/>
+              </a:rPr>
+              <a:t>// tour de rôle</a:t>
+            </a:r>
+          </a:p>
+          <a:p>
+            <a:r>
+              <a:rPr lang="fr-FR" dirty="0" err="1">
+                <a:ea typeface="+mn-lt"/>
+                <a:cs typeface="+mn-lt"/>
+              </a:rPr>
+              <a:t>bool</a:t>
+            </a:r>
+            <a:r>
+              <a:rPr lang="fr-FR" dirty="0">
+                <a:ea typeface="+mn-lt"/>
+                <a:cs typeface="+mn-lt"/>
+              </a:rPr>
+              <a:t> </a:t>
+            </a:r>
+            <a:r>
+              <a:rPr lang="fr-FR" dirty="0" err="1">
+                <a:ea typeface="+mn-lt"/>
+                <a:cs typeface="+mn-lt"/>
+              </a:rPr>
+              <a:t>p</a:t>
+            </a:r>
+            <a:r>
+              <a:rPr lang="fr-FR" dirty="0" err="1" smtClean="0">
+                <a:ea typeface="+mn-lt"/>
+                <a:cs typeface="+mn-lt"/>
+              </a:rPr>
+              <a:t>ass</a:t>
+            </a:r>
+            <a:r>
+              <a:rPr lang="fr-FR" dirty="0">
+                <a:ea typeface="+mn-lt"/>
+                <a:cs typeface="+mn-lt"/>
+              </a:rPr>
+              <a:t>(); </a:t>
+            </a:r>
+            <a:r>
+              <a:rPr lang="fr-FR" sz="1200" dirty="0">
+                <a:ea typeface="+mn-lt"/>
+                <a:cs typeface="+mn-lt"/>
+              </a:rPr>
+              <a:t>// forcer le passage de tour (</a:t>
+            </a:r>
+            <a:r>
+              <a:rPr lang="fr-FR" sz="1200" dirty="0" err="1">
+                <a:ea typeface="+mn-lt"/>
+                <a:cs typeface="+mn-lt"/>
+              </a:rPr>
+              <a:t>true</a:t>
+            </a:r>
+            <a:r>
+              <a:rPr lang="fr-FR" sz="1200" dirty="0">
+                <a:ea typeface="+mn-lt"/>
+                <a:cs typeface="+mn-lt"/>
+              </a:rPr>
+              <a:t> si le joueur doit passer et false si le </a:t>
+            </a:r>
+            <a:r>
+              <a:rPr lang="fr-FR" sz="1200" dirty="0" smtClean="0">
+                <a:ea typeface="+mn-lt"/>
+                <a:cs typeface="+mn-lt"/>
+              </a:rPr>
+              <a:t>			jeu </a:t>
+            </a:r>
+            <a:r>
+              <a:rPr lang="fr-FR" sz="1200" dirty="0">
+                <a:ea typeface="+mn-lt"/>
+                <a:cs typeface="+mn-lt"/>
+              </a:rPr>
+              <a:t>est terminé.</a:t>
+            </a:r>
+            <a:endParaRPr lang="en-US" sz="1200" dirty="0">
+              <a:ea typeface="+mn-lt"/>
+              <a:cs typeface="+mn-lt"/>
+            </a:endParaRPr>
+          </a:p>
+          <a:p>
+            <a:r>
+              <a:rPr lang="fr-FR" dirty="0">
+                <a:ea typeface="+mn-lt"/>
+                <a:cs typeface="+mn-lt"/>
+              </a:rPr>
+              <a:t>           </a:t>
+            </a:r>
+            <a:endParaRPr lang="en-US" dirty="0">
+              <a:ea typeface="+mn-lt"/>
+              <a:cs typeface="+mn-lt"/>
+            </a:endParaRPr>
+          </a:p>
+          <a:p>
+            <a:r>
+              <a:rPr lang="fr-FR" dirty="0">
+                <a:ea typeface="+mn-lt"/>
+                <a:cs typeface="+mn-lt"/>
+              </a:rPr>
+              <a:t>bool mouvement_legal(int i, int j</a:t>
+            </a:r>
+            <a:r>
+              <a:rPr lang="fr-FR" dirty="0" smtClean="0">
+                <a:ea typeface="+mn-lt"/>
+                <a:cs typeface="+mn-lt"/>
+              </a:rPr>
+              <a:t>); </a:t>
+            </a:r>
+            <a:r>
+              <a:rPr lang="fr-FR" sz="1200" dirty="0">
+                <a:ea typeface="+mn-lt"/>
+                <a:cs typeface="+mn-lt"/>
+              </a:rPr>
+              <a:t>// </a:t>
+            </a:r>
+            <a:r>
+              <a:rPr lang="fr-FR" sz="1200" dirty="0" err="1">
+                <a:ea typeface="+mn-lt"/>
+                <a:cs typeface="+mn-lt"/>
+              </a:rPr>
+              <a:t>true</a:t>
+            </a:r>
+            <a:r>
+              <a:rPr lang="fr-FR" sz="1200" dirty="0">
+                <a:ea typeface="+mn-lt"/>
+                <a:cs typeface="+mn-lt"/>
+              </a:rPr>
+              <a:t> si le mouvement choisie par </a:t>
+            </a:r>
+            <a:r>
+              <a:rPr lang="fr-FR" sz="1200" dirty="0" smtClean="0">
+                <a:ea typeface="+mn-lt"/>
+                <a:cs typeface="+mn-lt"/>
+              </a:rPr>
+              <a:t>							le </a:t>
+            </a:r>
+            <a:r>
+              <a:rPr lang="fr-FR" sz="1200" dirty="0">
+                <a:ea typeface="+mn-lt"/>
+                <a:cs typeface="+mn-lt"/>
+              </a:rPr>
+              <a:t>joueur est permis et false </a:t>
+            </a:r>
+            <a:r>
+              <a:rPr lang="fr-FR" sz="1200" dirty="0" smtClean="0">
+                <a:ea typeface="+mn-lt"/>
+                <a:cs typeface="+mn-lt"/>
+              </a:rPr>
+              <a:t>sinon,</a:t>
+            </a:r>
+            <a:endParaRPr lang="en-US" sz="1200" dirty="0">
+              <a:ea typeface="+mn-lt"/>
+              <a:cs typeface="+mn-lt"/>
+            </a:endParaRPr>
+          </a:p>
+          <a:p>
+            <a:r>
+              <a:rPr lang="fr-FR" dirty="0" err="1">
+                <a:ea typeface="+mn-lt"/>
+                <a:cs typeface="+mn-lt"/>
+              </a:rPr>
+              <a:t>int</a:t>
+            </a:r>
+            <a:r>
+              <a:rPr lang="fr-FR" dirty="0">
+                <a:ea typeface="+mn-lt"/>
+                <a:cs typeface="+mn-lt"/>
+              </a:rPr>
+              <a:t> </a:t>
+            </a:r>
+            <a:r>
+              <a:rPr lang="fr-FR" dirty="0" err="1">
+                <a:ea typeface="+mn-lt"/>
+                <a:cs typeface="+mn-lt"/>
+              </a:rPr>
+              <a:t>update_mouvement_legal</a:t>
+            </a:r>
+            <a:r>
+              <a:rPr lang="fr-FR" dirty="0">
+                <a:ea typeface="+mn-lt"/>
+                <a:cs typeface="+mn-lt"/>
+              </a:rPr>
+              <a:t>(); </a:t>
+            </a:r>
+            <a:r>
+              <a:rPr lang="fr-FR" sz="1200" dirty="0">
+                <a:ea typeface="+mn-lt"/>
+                <a:cs typeface="+mn-lt"/>
+              </a:rPr>
+              <a:t>// mise a jour de la table </a:t>
+            </a:r>
+            <a:r>
+              <a:rPr lang="fr-FR" sz="1200" dirty="0" err="1">
+                <a:ea typeface="+mn-lt"/>
+                <a:cs typeface="+mn-lt"/>
+              </a:rPr>
+              <a:t>lbord</a:t>
+            </a:r>
+            <a:r>
+              <a:rPr lang="fr-FR" sz="1200" dirty="0">
+                <a:ea typeface="+mn-lt"/>
+                <a:cs typeface="+mn-lt"/>
+              </a:rPr>
+              <a:t> de </a:t>
+            </a:r>
+            <a:r>
+              <a:rPr lang="fr-FR" sz="1200" dirty="0" smtClean="0">
+                <a:ea typeface="+mn-lt"/>
+                <a:cs typeface="+mn-lt"/>
+              </a:rPr>
+              <a:t>								mouvements permises,</a:t>
+            </a:r>
+            <a:endParaRPr lang="en-US" sz="1200" dirty="0">
+              <a:ea typeface="+mn-lt"/>
+              <a:cs typeface="+mn-lt"/>
+            </a:endParaRPr>
+          </a:p>
+          <a:p>
+            <a:r>
+              <a:rPr lang="fr-FR" dirty="0" err="1">
+                <a:ea typeface="+mn-lt"/>
+                <a:cs typeface="+mn-lt"/>
+              </a:rPr>
+              <a:t>void</a:t>
+            </a:r>
+            <a:r>
+              <a:rPr lang="fr-FR" dirty="0">
+                <a:ea typeface="+mn-lt"/>
+                <a:cs typeface="+mn-lt"/>
+              </a:rPr>
+              <a:t> move(); </a:t>
+            </a:r>
+            <a:r>
+              <a:rPr lang="fr-FR" sz="1200" dirty="0">
+                <a:ea typeface="+mn-lt"/>
+                <a:cs typeface="+mn-lt"/>
+              </a:rPr>
+              <a:t>// place le pion du </a:t>
+            </a:r>
+            <a:r>
+              <a:rPr lang="fr-FR" sz="1200" dirty="0" err="1">
+                <a:ea typeface="+mn-lt"/>
+                <a:cs typeface="+mn-lt"/>
+              </a:rPr>
+              <a:t>jeueur</a:t>
+            </a:r>
+            <a:r>
+              <a:rPr lang="fr-FR" sz="1200" dirty="0">
+                <a:ea typeface="+mn-lt"/>
+                <a:cs typeface="+mn-lt"/>
+              </a:rPr>
+              <a:t> dans la place choisie</a:t>
+            </a:r>
+          </a:p>
+          <a:p>
+            <a:r>
+              <a:rPr lang="fr-FR" dirty="0" err="1" smtClean="0">
+                <a:ea typeface="+mn-lt"/>
+                <a:cs typeface="+mn-lt"/>
+              </a:rPr>
+              <a:t>void</a:t>
+            </a:r>
+            <a:r>
+              <a:rPr lang="fr-FR" dirty="0" smtClean="0">
+                <a:ea typeface="+mn-lt"/>
+                <a:cs typeface="+mn-lt"/>
+              </a:rPr>
+              <a:t> </a:t>
+            </a:r>
+            <a:r>
+              <a:rPr lang="fr-FR" dirty="0" err="1">
+                <a:ea typeface="+mn-lt"/>
+                <a:cs typeface="+mn-lt"/>
+              </a:rPr>
+              <a:t>jeu_termine</a:t>
+            </a:r>
+            <a:r>
+              <a:rPr lang="fr-FR" dirty="0">
+                <a:ea typeface="+mn-lt"/>
+                <a:cs typeface="+mn-lt"/>
+              </a:rPr>
+              <a:t>(); </a:t>
+            </a:r>
+            <a:r>
+              <a:rPr lang="fr-FR" sz="1200" dirty="0">
+                <a:ea typeface="+mn-lt"/>
+                <a:cs typeface="+mn-lt"/>
+              </a:rPr>
+              <a:t>// declencher la fin du jeu </a:t>
+            </a:r>
+            <a:endParaRPr lang="en-US" sz="1200" dirty="0">
+              <a:ea typeface="+mn-lt"/>
+              <a:cs typeface="+mn-lt"/>
+            </a:endParaRPr>
+          </a:p>
+          <a:p>
+            <a:r>
+              <a:rPr lang="fr-FR" dirty="0" err="1">
+                <a:ea typeface="+mn-lt"/>
+                <a:cs typeface="+mn-lt"/>
+              </a:rPr>
+              <a:t>void</a:t>
+            </a:r>
+            <a:r>
+              <a:rPr lang="fr-FR" dirty="0">
+                <a:ea typeface="+mn-lt"/>
+                <a:cs typeface="+mn-lt"/>
+              </a:rPr>
+              <a:t> </a:t>
+            </a:r>
+            <a:r>
+              <a:rPr lang="fr-FR" dirty="0" err="1">
+                <a:ea typeface="+mn-lt"/>
+                <a:cs typeface="+mn-lt"/>
+              </a:rPr>
+              <a:t>printBoard</a:t>
+            </a:r>
+            <a:r>
+              <a:rPr lang="fr-FR" dirty="0">
+                <a:ea typeface="+mn-lt"/>
+                <a:cs typeface="+mn-lt"/>
+              </a:rPr>
+              <a:t>(); </a:t>
+            </a:r>
+            <a:r>
+              <a:rPr lang="fr-FR" dirty="0" smtClean="0">
+                <a:ea typeface="+mn-lt"/>
+                <a:cs typeface="+mn-lt"/>
+              </a:rPr>
+              <a:t> </a:t>
+            </a:r>
+            <a:r>
+              <a:rPr lang="fr-FR" sz="1200" dirty="0" smtClean="0">
+                <a:ea typeface="+mn-lt"/>
+                <a:cs typeface="+mn-lt"/>
+              </a:rPr>
+              <a:t>//</a:t>
+            </a:r>
+            <a:r>
+              <a:rPr lang="fr-FR" sz="1200" dirty="0">
+                <a:ea typeface="+mn-lt"/>
+                <a:cs typeface="+mn-lt"/>
+              </a:rPr>
+              <a:t>affiche la table de jeu </a:t>
+            </a:r>
+            <a:endParaRPr lang="en-US" sz="1200" dirty="0">
+              <a:ea typeface="+mn-lt"/>
+              <a:cs typeface="+mn-lt"/>
+            </a:endParaRPr>
+          </a:p>
+          <a:p>
+            <a:endParaRPr lang="fr-FR" dirty="0"/>
+          </a:p>
+        </p:txBody>
+      </p:sp>
+      <p:sp>
+        <p:nvSpPr>
+          <p:cNvPr id="5" name="ZoneTexte 4">
+            <a:extLst>
+              <a:ext uri="{FF2B5EF4-FFF2-40B4-BE49-F238E27FC236}">
+                <a16:creationId xmlns="" xmlns:a16="http://schemas.microsoft.com/office/drawing/2014/main" id="{EC6C3E16-F1AC-4CED-984F-5937593D99E9}"/>
+              </a:ext>
+            </a:extLst>
+          </p:cNvPr>
+          <p:cNvSpPr txBox="1"/>
+          <p:nvPr/>
+        </p:nvSpPr>
+        <p:spPr>
+          <a:xfrm>
+            <a:off x="1275941" y="1844297"/>
+            <a:ext cx="2743199" cy="523220"/>
+          </a:xfrm>
+          <a:prstGeom prst="rect">
+            <a:avLst/>
+          </a:prstGeom>
+          <a:noFill/>
+        </p:spPr>
+        <p:txBody>
+          <a:bodyPr rot="0" spcFirstLastPara="0" vertOverflow="overflow" horzOverflow="overflow" vert="horz" wrap="square" lIns="91440" tIns="45720" rIns="91440" bIns="45720" numCol="1" spcCol="0" rtlCol="0" fromWordArt="0" anchor="t" anchorCtr="0" forceAA="0" compatLnSpc="1">
+            <a:prstTxWarp prst="textNoShape">
+              <a:avLst/>
+            </a:prstTxWarp>
+            <a:spAutoFit/>
+          </a:bodyPr>
+          <a:lstStyle/>
+          <a:p>
+            <a:pPr algn="l"/>
+            <a:r>
+              <a:rPr lang="fr-FR" sz="2800" b="1" dirty="0" err="1"/>
+              <a:t>Othello.h</a:t>
+            </a:r>
+            <a:endParaRPr lang="fr-FR" sz="2800" b="1" dirty="0"/>
+          </a:p>
+        </p:txBody>
+      </p:sp>
+    </p:spTree>
+    <p:extLst>
+      <p:ext uri="{BB962C8B-B14F-4D97-AF65-F5344CB8AC3E}">
+        <p14:creationId xmlns:p14="http://schemas.microsoft.com/office/powerpoint/2010/main" val="1576491551"/>
+      </p:ext>
+    </p:extLst>
+  </p:cSld>
+  <p:clrMapOvr>
+    <a:masterClrMapping/>
+  </p:clrMapOvr>
+  <p:timing>
+    <p:tnLst>
+      <p:par>
+        <p:cTn id="1" dur="indefinite" restart="never" nodeType="tmRoot">
+          <p:childTnLst>
+            <p:seq concurrent="1" nextAc="seek">
+              <p:cTn id="2" dur="indefinite" nodeType="mainSeq">
+                <p:childTnLst>
+                  <p:par>
+                    <p:cTn id="3" fill="hold">
+                      <p:stCondLst>
+                        <p:cond delay="indefinite"/>
+                      </p:stCondLst>
+                      <p:childTnLst>
+                        <p:par>
+                          <p:cTn id="4" fill="hold">
+                            <p:stCondLst>
+                              <p:cond delay="0"/>
+                            </p:stCondLst>
+                            <p:childTnLst>
+                              <p:par>
+                                <p:cTn id="5" presetID="22" presetClass="entr" presetSubtype="4" fill="hold" grpId="0" nodeType="clickEffect">
+                                  <p:stCondLst>
+                                    <p:cond delay="0"/>
+                                  </p:stCondLst>
+                                  <p:childTnLst>
+                                    <p:set>
+                                      <p:cBhvr>
+                                        <p:cTn id="6" dur="1" fill="hold">
+                                          <p:stCondLst>
+                                            <p:cond delay="0"/>
+                                          </p:stCondLst>
+                                        </p:cTn>
+                                        <p:tgtEl>
+                                          <p:spTgt spid="2"/>
+                                        </p:tgtEl>
+                                        <p:attrNameLst>
+                                          <p:attrName>style.visibility</p:attrName>
+                                        </p:attrNameLst>
+                                      </p:cBhvr>
+                                      <p:to>
+                                        <p:strVal val="visible"/>
+                                      </p:to>
+                                    </p:set>
+                                    <p:animEffect transition="in" filter="wipe(down)">
+                                      <p:cBhvr>
+                                        <p:cTn id="7" dur="500"/>
+                                        <p:tgtEl>
+                                          <p:spTgt spid="2"/>
+                                        </p:tgtEl>
+                                      </p:cBhvr>
+                                    </p:animEffect>
+                                  </p:childTnLst>
+                                </p:cTn>
+                              </p:par>
+                            </p:childTnLst>
+                          </p:cTn>
+                        </p:par>
+                      </p:childTnLst>
+                    </p:cTn>
+                  </p:par>
+                  <p:par>
+                    <p:cTn id="8" fill="hold">
+                      <p:stCondLst>
+                        <p:cond delay="indefinite"/>
+                      </p:stCondLst>
+                      <p:childTnLst>
+                        <p:par>
+                          <p:cTn id="9" fill="hold">
+                            <p:stCondLst>
+                              <p:cond delay="0"/>
+                            </p:stCondLst>
+                            <p:childTnLst>
+                              <p:par>
+                                <p:cTn id="10" presetID="10" presetClass="entr" presetSubtype="0" fill="hold" grpId="0" nodeType="clickEffect">
+                                  <p:stCondLst>
+                                    <p:cond delay="0"/>
+                                  </p:stCondLst>
+                                  <p:childTnLst>
+                                    <p:set>
+                                      <p:cBhvr>
+                                        <p:cTn id="11" dur="1" fill="hold">
+                                          <p:stCondLst>
+                                            <p:cond delay="0"/>
+                                          </p:stCondLst>
+                                        </p:cTn>
+                                        <p:tgtEl>
+                                          <p:spTgt spid="5"/>
+                                        </p:tgtEl>
+                                        <p:attrNameLst>
+                                          <p:attrName>style.visibility</p:attrName>
+                                        </p:attrNameLst>
+                                      </p:cBhvr>
+                                      <p:to>
+                                        <p:strVal val="visible"/>
+                                      </p:to>
+                                    </p:set>
+                                    <p:animEffect transition="in" filter="fade">
+                                      <p:cBhvr>
+                                        <p:cTn id="12" dur="500"/>
+                                        <p:tgtEl>
+                                          <p:spTgt spid="5"/>
+                                        </p:tgtEl>
+                                      </p:cBhvr>
+                                    </p:animEffect>
+                                  </p:childTnLst>
+                                </p:cTn>
+                              </p:par>
+                            </p:childTnLst>
+                          </p:cTn>
+                        </p:par>
+                      </p:childTnLst>
+                    </p:cTn>
+                  </p:par>
+                  <p:par>
+                    <p:cTn id="13" fill="hold">
+                      <p:stCondLst>
+                        <p:cond delay="indefinite"/>
+                      </p:stCondLst>
+                      <p:childTnLst>
+                        <p:par>
+                          <p:cTn id="14" fill="hold">
+                            <p:stCondLst>
+                              <p:cond delay="0"/>
+                            </p:stCondLst>
+                            <p:childTnLst>
+                              <p:par>
+                                <p:cTn id="15" presetID="10" presetClass="entr" presetSubtype="0" fill="hold" grpId="0" nodeType="clickEffect">
+                                  <p:stCondLst>
+                                    <p:cond delay="0"/>
+                                  </p:stCondLst>
+                                  <p:childTnLst>
+                                    <p:set>
+                                      <p:cBhvr>
+                                        <p:cTn id="16" dur="1" fill="hold">
+                                          <p:stCondLst>
+                                            <p:cond delay="0"/>
+                                          </p:stCondLst>
+                                        </p:cTn>
+                                        <p:tgtEl>
+                                          <p:spTgt spid="3"/>
+                                        </p:tgtEl>
+                                        <p:attrNameLst>
+                                          <p:attrName>style.visibility</p:attrName>
+                                        </p:attrNameLst>
+                                      </p:cBhvr>
+                                      <p:to>
+                                        <p:strVal val="visible"/>
+                                      </p:to>
+                                    </p:set>
+                                    <p:animEffect transition="in" filter="fade">
+                                      <p:cBhvr>
+                                        <p:cTn id="17" dur="500"/>
+                                        <p:tgtEl>
+                                          <p:spTgt spid="3"/>
+                                        </p:tgtEl>
+                                      </p:cBhvr>
+                                    </p:animEffect>
+                                  </p:childTnLst>
+                                </p:cTn>
+                              </p:par>
+                            </p:childTnLst>
+                          </p:cTn>
+                        </p:par>
+                      </p:childTnLst>
+                    </p:cTn>
+                  </p:par>
+                  <p:par>
+                    <p:cTn id="18" fill="hold">
+                      <p:stCondLst>
+                        <p:cond delay="indefinite"/>
+                      </p:stCondLst>
+                      <p:childTnLst>
+                        <p:par>
+                          <p:cTn id="19" fill="hold">
+                            <p:stCondLst>
+                              <p:cond delay="0"/>
+                            </p:stCondLst>
+                            <p:childTnLst>
+                              <p:par>
+                                <p:cTn id="20" presetID="10" presetClass="entr" presetSubtype="0" fill="hold" grpId="0" nodeType="clickEffect">
+                                  <p:stCondLst>
+                                    <p:cond delay="0"/>
+                                  </p:stCondLst>
+                                  <p:childTnLst>
+                                    <p:set>
+                                      <p:cBhvr>
+                                        <p:cTn id="21" dur="1" fill="hold">
+                                          <p:stCondLst>
+                                            <p:cond delay="0"/>
+                                          </p:stCondLst>
+                                        </p:cTn>
+                                        <p:tgtEl>
+                                          <p:spTgt spid="4"/>
+                                        </p:tgtEl>
+                                        <p:attrNameLst>
+                                          <p:attrName>style.visibility</p:attrName>
+                                        </p:attrNameLst>
+                                      </p:cBhvr>
+                                      <p:to>
+                                        <p:strVal val="visible"/>
+                                      </p:to>
+                                    </p:set>
+                                    <p:animEffect transition="in" filter="fade">
+                                      <p:cBhvr>
+                                        <p:cTn id="22" dur="500"/>
+                                        <p:tgtEl>
+                                          <p:spTgt spid="4"/>
+                                        </p:tgtEl>
+                                      </p:cBhvr>
+                                    </p:animEffect>
+                                  </p:childTnLst>
+                                </p:cTn>
+                              </p:par>
+                            </p:childTnLst>
+                          </p:cTn>
+                        </p:par>
+                      </p:childTnLst>
+                    </p:cTn>
+                  </p:par>
+                </p:childTnLst>
+              </p:cTn>
+              <p:prevCondLst>
+                <p:cond evt="onPrev" delay="0">
+                  <p:tgtEl>
+                    <p:sldTgt/>
+                  </p:tgtEl>
+                </p:cond>
+              </p:prevCondLst>
+              <p:nextCondLst>
+                <p:cond evt="onNext" delay="0">
+                  <p:tgtEl>
+                    <p:sldTgt/>
+                  </p:tgtEl>
+                </p:cond>
+              </p:nextCondLst>
+            </p:seq>
+          </p:childTnLst>
+        </p:cTn>
+      </p:par>
+    </p:tnLst>
+    <p:bldLst>
+      <p:bldP spid="2" grpId="0"/>
+      <p:bldP spid="3" grpId="0"/>
+      <p:bldP spid="4" grpId="0"/>
+      <p:bldP spid="5" grpId="0"/>
+    </p:bldLst>
+  </p:timing>
+</p:sld>
+</file>
+
+<file path=ppt/slides/slide14.xml><?xml version="1.0" encoding="utf-8"?>
+<p:sld xmlns:a="http://schemas.openxmlformats.org/drawingml/2006/main" xmlns:r="http://schemas.openxmlformats.org/officeDocument/2006/relationships" xmlns:p="http://schemas.openxmlformats.org/presentationml/2006/main">
+  <p:cSld>
+    <p:spTree>
+      <p:nvGrpSpPr>
+        <p:cNvPr id="1" name=""/>
+        <p:cNvGrpSpPr/>
+        <p:nvPr/>
+      </p:nvGrpSpPr>
+      <p:grpSpPr>
+        <a:xfrm>
+          <a:off x="0" y="0"/>
+          <a:ext cx="0" cy="0"/>
+          <a:chOff x="0" y="0"/>
+          <a:chExt cx="0" cy="0"/>
+        </a:xfrm>
+      </p:grpSpPr>
+      <p:sp>
+        <p:nvSpPr>
+          <p:cNvPr id="2" name="Titre 1">
+            <a:extLst>
+              <a:ext uri="{FF2B5EF4-FFF2-40B4-BE49-F238E27FC236}">
+                <a16:creationId xmlns="" xmlns:a16="http://schemas.microsoft.com/office/drawing/2014/main" id="{8F8ED102-DB70-4795-8F34-9EE6F6978AAE}"/>
+              </a:ext>
+            </a:extLst>
+          </p:cNvPr>
+          <p:cNvSpPr>
+            <a:spLocks noGrp="1"/>
+          </p:cNvSpPr>
+          <p:nvPr>
+            <p:ph type="title"/>
+          </p:nvPr>
+        </p:nvSpPr>
+        <p:spPr/>
+        <p:txBody>
+          <a:bodyPr/>
+          <a:lstStyle/>
+          <a:p>
+            <a:pPr algn="ctr"/>
+            <a:r>
+              <a:rPr lang="fr-FR" dirty="0"/>
+              <a:t>Les classes, les méthodes </a:t>
+            </a:r>
+            <a:br>
+              <a:rPr lang="fr-FR" dirty="0"/>
+            </a:br>
+            <a:r>
+              <a:rPr lang="fr-FR" dirty="0"/>
+              <a:t>et les attributs</a:t>
+            </a:r>
+          </a:p>
+        </p:txBody>
+      </p:sp>
+      <p:sp>
+        <p:nvSpPr>
+          <p:cNvPr id="3" name="ZoneTexte 2">
+            <a:extLst>
+              <a:ext uri="{FF2B5EF4-FFF2-40B4-BE49-F238E27FC236}">
+                <a16:creationId xmlns="" xmlns:a16="http://schemas.microsoft.com/office/drawing/2014/main" id="{33F8762C-9F81-40CC-84C9-097B610492BB}"/>
+              </a:ext>
+            </a:extLst>
+          </p:cNvPr>
+          <p:cNvSpPr txBox="1"/>
+          <p:nvPr/>
+        </p:nvSpPr>
+        <p:spPr>
+          <a:xfrm>
+            <a:off x="2016654" y="2171700"/>
+            <a:ext cx="3683502" cy="2185214"/>
+          </a:xfrm>
+          <a:prstGeom prst="rect">
+            <a:avLst/>
+          </a:prstGeom>
+          <a:noFill/>
+        </p:spPr>
+        <p:txBody>
+          <a:bodyPr rot="0" spcFirstLastPara="0" vertOverflow="overflow" horzOverflow="overflow" vert="horz" wrap="square" lIns="91440" tIns="45720" rIns="91440" bIns="45720" numCol="1" spcCol="0" rtlCol="0" fromWordArt="0" anchor="t" anchorCtr="0" forceAA="0" compatLnSpc="1">
+            <a:prstTxWarp prst="textNoShape">
+              <a:avLst/>
+            </a:prstTxWarp>
+            <a:spAutoFit/>
+          </a:bodyPr>
+          <a:lstStyle/>
+          <a:p>
+            <a:endParaRPr lang="fr-FR" dirty="0"/>
+          </a:p>
+          <a:p>
+            <a:endParaRPr lang="fr-FR" sz="2800" b="1" dirty="0"/>
+          </a:p>
+          <a:p>
+            <a:r>
+              <a:rPr lang="fr-FR" dirty="0"/>
+              <a:t>     </a:t>
+            </a:r>
+            <a:r>
+              <a:rPr lang="fr-FR" b="1" dirty="0" err="1">
+                <a:ea typeface="+mn-lt"/>
+                <a:cs typeface="+mn-lt"/>
+              </a:rPr>
+              <a:t>Private</a:t>
+            </a:r>
+            <a:r>
+              <a:rPr lang="fr-FR" b="1" dirty="0">
+                <a:ea typeface="+mn-lt"/>
+                <a:cs typeface="+mn-lt"/>
+              </a:rPr>
+              <a:t> </a:t>
+            </a:r>
+            <a:r>
+              <a:rPr lang="fr-FR" b="1" dirty="0" smtClean="0">
+                <a:ea typeface="+mn-lt"/>
+                <a:cs typeface="+mn-lt"/>
+              </a:rPr>
+              <a:t>:</a:t>
+            </a:r>
+          </a:p>
+          <a:p>
+            <a:endParaRPr lang="fr-FR" b="1" dirty="0">
+              <a:ea typeface="+mn-lt"/>
+              <a:cs typeface="+mn-lt"/>
+            </a:endParaRPr>
+          </a:p>
+          <a:p>
+            <a:r>
+              <a:rPr lang="fr-FR" dirty="0"/>
+              <a:t>            String </a:t>
+            </a:r>
+            <a:r>
+              <a:rPr lang="fr-FR" dirty="0" smtClean="0"/>
+              <a:t>couleur ;</a:t>
+            </a:r>
+            <a:endParaRPr lang="fr-FR" dirty="0"/>
+          </a:p>
+          <a:p>
+            <a:r>
+              <a:rPr lang="fr-FR" dirty="0"/>
+              <a:t>            Int </a:t>
+            </a:r>
+            <a:r>
+              <a:rPr lang="fr-FR" dirty="0" smtClean="0"/>
+              <a:t>score ;</a:t>
+            </a:r>
+            <a:r>
+              <a:rPr lang="fr-FR" dirty="0"/>
+              <a:t>            </a:t>
+            </a:r>
+          </a:p>
+          <a:p>
+            <a:r>
+              <a:rPr lang="fr-FR" dirty="0"/>
+              <a:t>            </a:t>
+            </a:r>
+          </a:p>
+        </p:txBody>
+      </p:sp>
+      <p:sp>
+        <p:nvSpPr>
+          <p:cNvPr id="6" name="ZoneTexte 5">
+            <a:extLst>
+              <a:ext uri="{FF2B5EF4-FFF2-40B4-BE49-F238E27FC236}">
+                <a16:creationId xmlns="" xmlns:a16="http://schemas.microsoft.com/office/drawing/2014/main" id="{C4A2E48D-992C-4669-B972-49BFA470C42F}"/>
+              </a:ext>
+            </a:extLst>
+          </p:cNvPr>
+          <p:cNvSpPr txBox="1"/>
+          <p:nvPr/>
+        </p:nvSpPr>
+        <p:spPr>
+          <a:xfrm>
+            <a:off x="1624208" y="1999989"/>
+            <a:ext cx="2743199" cy="523220"/>
+          </a:xfrm>
+          <a:prstGeom prst="rect">
+            <a:avLst/>
+          </a:prstGeom>
+          <a:noFill/>
+        </p:spPr>
+        <p:txBody>
+          <a:bodyPr rot="0" spcFirstLastPara="0" vertOverflow="overflow" horzOverflow="overflow" vert="horz" wrap="square" lIns="91440" tIns="45720" rIns="91440" bIns="45720" numCol="1" spcCol="0" rtlCol="0" fromWordArt="0" anchor="t" anchorCtr="0" forceAA="0" compatLnSpc="1">
+            <a:prstTxWarp prst="textNoShape">
+              <a:avLst/>
+            </a:prstTxWarp>
+            <a:spAutoFit/>
+          </a:bodyPr>
+          <a:lstStyle/>
+          <a:p>
+            <a:pPr algn="l"/>
+            <a:r>
+              <a:rPr lang="fr-FR" sz="2800" b="1" dirty="0" err="1">
+                <a:ea typeface="+mn-lt"/>
+                <a:cs typeface="+mn-lt"/>
+              </a:rPr>
+              <a:t>Player.h</a:t>
+            </a:r>
+            <a:endParaRPr lang="fr-FR" sz="2800" dirty="0"/>
+          </a:p>
+        </p:txBody>
+      </p:sp>
+      <p:sp>
+        <p:nvSpPr>
+          <p:cNvPr id="4" name="ZoneTexte 3"/>
+          <p:cNvSpPr txBox="1"/>
+          <p:nvPr/>
+        </p:nvSpPr>
+        <p:spPr>
+          <a:xfrm>
+            <a:off x="6317672" y="2831967"/>
+            <a:ext cx="5415148" cy="2769989"/>
+          </a:xfrm>
+          <a:prstGeom prst="rect">
+            <a:avLst/>
+          </a:prstGeom>
+          <a:noFill/>
+        </p:spPr>
+        <p:txBody>
+          <a:bodyPr wrap="square" rtlCol="0">
+            <a:spAutoFit/>
+          </a:bodyPr>
+          <a:lstStyle/>
+          <a:p>
+            <a:r>
+              <a:rPr lang="fr-FR" b="1" dirty="0">
+                <a:ea typeface="+mn-lt"/>
+                <a:cs typeface="+mn-lt"/>
+              </a:rPr>
+              <a:t>Public : </a:t>
+            </a:r>
+          </a:p>
+          <a:p>
+            <a:endParaRPr lang="fr-FR" dirty="0" smtClean="0"/>
+          </a:p>
+          <a:p>
+            <a:r>
+              <a:rPr lang="fr-FR" dirty="0"/>
+              <a:t>Player(</a:t>
+            </a:r>
+            <a:r>
+              <a:rPr lang="fr-FR" dirty="0">
+                <a:ea typeface="+mn-lt"/>
+                <a:cs typeface="+mn-lt"/>
+              </a:rPr>
+              <a:t>string</a:t>
+            </a:r>
+            <a:r>
+              <a:rPr lang="fr-FR" dirty="0"/>
+              <a:t> </a:t>
+            </a:r>
+            <a:r>
+              <a:rPr lang="fr-FR" dirty="0" smtClean="0"/>
+              <a:t>col);</a:t>
+            </a:r>
+            <a:r>
+              <a:rPr lang="fr-FR" sz="1200" dirty="0" smtClean="0">
+                <a:ea typeface="+mn-lt"/>
+                <a:cs typeface="+mn-lt"/>
+              </a:rPr>
+              <a:t>  //</a:t>
+            </a:r>
+            <a:r>
+              <a:rPr lang="fr-FR" sz="1200" dirty="0">
+                <a:ea typeface="+mn-lt"/>
+                <a:cs typeface="+mn-lt"/>
+              </a:rPr>
+              <a:t>constructeur </a:t>
+            </a:r>
+          </a:p>
+          <a:p>
+            <a:r>
+              <a:rPr lang="fr-FR" dirty="0" smtClean="0"/>
+              <a:t>~Player();  </a:t>
+            </a:r>
+            <a:r>
+              <a:rPr lang="fr-FR" sz="1200" dirty="0">
+                <a:ea typeface="+mn-lt"/>
+                <a:cs typeface="+mn-lt"/>
+              </a:rPr>
+              <a:t>//destructeur</a:t>
+            </a:r>
+            <a:endParaRPr lang="fr-FR" sz="1200" dirty="0">
+              <a:ea typeface="+mn-lt"/>
+              <a:cs typeface="+mn-lt"/>
+            </a:endParaRPr>
+          </a:p>
+          <a:p>
+            <a:r>
+              <a:rPr lang="fr-FR" dirty="0" smtClean="0">
+                <a:ea typeface="+mn-lt"/>
+                <a:cs typeface="+mn-lt"/>
+              </a:rPr>
+              <a:t>string </a:t>
+            </a:r>
+            <a:r>
+              <a:rPr lang="fr-FR" dirty="0" err="1">
+                <a:ea typeface="+mn-lt"/>
+                <a:cs typeface="+mn-lt"/>
+              </a:rPr>
+              <a:t>getColor</a:t>
+            </a:r>
+            <a:r>
+              <a:rPr lang="fr-FR" dirty="0" smtClean="0">
+                <a:ea typeface="+mn-lt"/>
+                <a:cs typeface="+mn-lt"/>
+              </a:rPr>
+              <a:t>(); </a:t>
+            </a:r>
+            <a:r>
+              <a:rPr lang="fr-FR" sz="1200" dirty="0">
+                <a:ea typeface="+mn-lt"/>
+                <a:cs typeface="+mn-lt"/>
+              </a:rPr>
+              <a:t>//retourne la couleur du pion associer a </a:t>
+            </a:r>
+            <a:r>
+              <a:rPr lang="fr-FR" sz="1200" dirty="0" smtClean="0">
+                <a:ea typeface="+mn-lt"/>
+                <a:cs typeface="+mn-lt"/>
+              </a:rPr>
+              <a:t>						ce </a:t>
+            </a:r>
+            <a:r>
+              <a:rPr lang="fr-FR" sz="1200" dirty="0">
+                <a:ea typeface="+mn-lt"/>
+                <a:cs typeface="+mn-lt"/>
+              </a:rPr>
+              <a:t>joueur</a:t>
+            </a:r>
+          </a:p>
+          <a:p>
+            <a:r>
+              <a:rPr lang="fr-FR" dirty="0" err="1" smtClean="0">
+                <a:ea typeface="+mn-lt"/>
+                <a:cs typeface="+mn-lt"/>
+              </a:rPr>
+              <a:t>int</a:t>
+            </a:r>
+            <a:r>
+              <a:rPr lang="fr-FR" dirty="0" smtClean="0">
+                <a:ea typeface="+mn-lt"/>
+                <a:cs typeface="+mn-lt"/>
+              </a:rPr>
+              <a:t> </a:t>
+            </a:r>
+            <a:r>
+              <a:rPr lang="fr-FR" dirty="0" err="1" smtClean="0">
+                <a:ea typeface="+mn-lt"/>
+                <a:cs typeface="+mn-lt"/>
+              </a:rPr>
+              <a:t>getScore</a:t>
+            </a:r>
+            <a:r>
+              <a:rPr lang="fr-FR" dirty="0" smtClean="0">
+                <a:ea typeface="+mn-lt"/>
+                <a:cs typeface="+mn-lt"/>
+              </a:rPr>
+              <a:t>(); </a:t>
+            </a:r>
+            <a:r>
+              <a:rPr lang="fr-FR" sz="1200" dirty="0">
+                <a:ea typeface="+mn-lt"/>
+                <a:cs typeface="+mn-lt"/>
+              </a:rPr>
+              <a:t>// retourne le score du </a:t>
+            </a:r>
+            <a:r>
+              <a:rPr lang="fr-FR" sz="1200" dirty="0" smtClean="0">
+                <a:ea typeface="+mn-lt"/>
+                <a:cs typeface="+mn-lt"/>
+              </a:rPr>
+              <a:t>joueur</a:t>
+            </a:r>
+            <a:endParaRPr lang="fr-FR" sz="1200" dirty="0">
+              <a:ea typeface="+mn-lt"/>
+              <a:cs typeface="+mn-lt"/>
+            </a:endParaRPr>
+          </a:p>
+          <a:p>
+            <a:r>
+              <a:rPr lang="fr-FR" dirty="0" err="1" smtClean="0">
+                <a:ea typeface="+mn-lt"/>
+                <a:cs typeface="+mn-lt"/>
+              </a:rPr>
+              <a:t>void</a:t>
+            </a:r>
+            <a:r>
+              <a:rPr lang="fr-FR" dirty="0" smtClean="0">
+                <a:ea typeface="+mn-lt"/>
+                <a:cs typeface="+mn-lt"/>
+              </a:rPr>
+              <a:t> </a:t>
+            </a:r>
+            <a:r>
+              <a:rPr lang="fr-FR" dirty="0" err="1" smtClean="0">
+                <a:ea typeface="+mn-lt"/>
+                <a:cs typeface="+mn-lt"/>
+              </a:rPr>
+              <a:t>setScore</a:t>
+            </a:r>
+            <a:r>
+              <a:rPr lang="fr-FR" dirty="0" smtClean="0">
+                <a:ea typeface="+mn-lt"/>
+                <a:cs typeface="+mn-lt"/>
+              </a:rPr>
+              <a:t>(</a:t>
+            </a:r>
+            <a:r>
+              <a:rPr lang="fr-FR" dirty="0" err="1" smtClean="0">
+                <a:ea typeface="+mn-lt"/>
+                <a:cs typeface="+mn-lt"/>
+              </a:rPr>
+              <a:t>int</a:t>
+            </a:r>
+            <a:r>
+              <a:rPr lang="fr-FR" dirty="0" smtClean="0">
+                <a:ea typeface="+mn-lt"/>
+                <a:cs typeface="+mn-lt"/>
+              </a:rPr>
+              <a:t>); </a:t>
+            </a:r>
+            <a:r>
+              <a:rPr lang="fr-FR" sz="1200" dirty="0" smtClean="0">
+                <a:ea typeface="+mn-lt"/>
+                <a:cs typeface="+mn-lt"/>
+              </a:rPr>
+              <a:t> //mise a jour du score du joueur</a:t>
+            </a:r>
+            <a:endParaRPr lang="fr-FR" sz="1200" dirty="0">
+              <a:ea typeface="+mn-lt"/>
+              <a:cs typeface="+mn-lt"/>
+            </a:endParaRPr>
+          </a:p>
+          <a:p>
+            <a:r>
+              <a:rPr lang="fr-FR" dirty="0" err="1" smtClean="0">
+                <a:ea typeface="+mn-lt"/>
+                <a:cs typeface="+mn-lt"/>
+              </a:rPr>
+              <a:t>void</a:t>
+            </a:r>
+            <a:r>
+              <a:rPr lang="fr-FR" dirty="0" smtClean="0">
+                <a:ea typeface="+mn-lt"/>
+                <a:cs typeface="+mn-lt"/>
+              </a:rPr>
+              <a:t> </a:t>
+            </a:r>
+            <a:r>
+              <a:rPr lang="fr-FR" dirty="0">
+                <a:ea typeface="+mn-lt"/>
+                <a:cs typeface="+mn-lt"/>
+              </a:rPr>
+              <a:t>affiche</a:t>
+            </a:r>
+            <a:r>
+              <a:rPr lang="fr-FR" dirty="0" smtClean="0">
+                <a:ea typeface="+mn-lt"/>
+                <a:cs typeface="+mn-lt"/>
+              </a:rPr>
+              <a:t>(); </a:t>
+            </a:r>
+            <a:r>
+              <a:rPr lang="fr-FR" sz="1200" dirty="0">
+                <a:ea typeface="+mn-lt"/>
+                <a:cs typeface="+mn-lt"/>
+              </a:rPr>
+              <a:t>// affiche le score et la couleur du pion associer a ce joueur </a:t>
+            </a:r>
+            <a:endParaRPr lang="fr-FR" sz="1200" dirty="0">
+              <a:ea typeface="+mn-lt"/>
+              <a:cs typeface="+mn-lt"/>
+            </a:endParaRPr>
+          </a:p>
+          <a:p>
+            <a:endParaRPr lang="fr-FR" dirty="0"/>
+          </a:p>
+        </p:txBody>
+      </p:sp>
+    </p:spTree>
+    <p:extLst>
+      <p:ext uri="{BB962C8B-B14F-4D97-AF65-F5344CB8AC3E}">
+        <p14:creationId xmlns:p14="http://schemas.microsoft.com/office/powerpoint/2010/main" val="2971253204"/>
+      </p:ext>
+    </p:extLst>
+  </p:cSld>
+  <p:clrMapOvr>
+    <a:masterClrMapping/>
+  </p:clrMapOvr>
+  <p:timing>
+    <p:tnLst>
+      <p:par>
+        <p:cTn id="1" dur="indefinite" restart="never" nodeType="tmRoot">
+          <p:childTnLst>
+            <p:seq concurrent="1" nextAc="seek">
+              <p:cTn id="2" dur="indefinite" nodeType="mainSeq">
+                <p:childTnLst>
+                  <p:par>
+                    <p:cTn id="3" fill="hold">
+                      <p:stCondLst>
+                        <p:cond delay="indefinite"/>
+                      </p:stCondLst>
+                      <p:childTnLst>
+                        <p:par>
+                          <p:cTn id="4" fill="hold">
+                            <p:stCondLst>
+                              <p:cond delay="0"/>
+                            </p:stCondLst>
+                            <p:childTnLst>
+                              <p:par>
+                                <p:cTn id="5" presetID="22" presetClass="entr" presetSubtype="4" fill="hold" grpId="0" nodeType="clickEffect">
+                                  <p:stCondLst>
+                                    <p:cond delay="0"/>
+                                  </p:stCondLst>
+                                  <p:childTnLst>
+                                    <p:set>
+                                      <p:cBhvr>
+                                        <p:cTn id="6" dur="1" fill="hold">
+                                          <p:stCondLst>
+                                            <p:cond delay="0"/>
+                                          </p:stCondLst>
+                                        </p:cTn>
+                                        <p:tgtEl>
+                                          <p:spTgt spid="2"/>
+                                        </p:tgtEl>
+                                        <p:attrNameLst>
+                                          <p:attrName>style.visibility</p:attrName>
+                                        </p:attrNameLst>
+                                      </p:cBhvr>
+                                      <p:to>
+                                        <p:strVal val="visible"/>
+                                      </p:to>
+                                    </p:set>
+                                    <p:animEffect transition="in" filter="wipe(down)">
+                                      <p:cBhvr>
+                                        <p:cTn id="7" dur="500"/>
+                                        <p:tgtEl>
+                                          <p:spTgt spid="2"/>
+                                        </p:tgtEl>
+                                      </p:cBhvr>
+                                    </p:animEffect>
+                                  </p:childTnLst>
+                                </p:cTn>
+                              </p:par>
+                            </p:childTnLst>
+                          </p:cTn>
+                        </p:par>
+                      </p:childTnLst>
+                    </p:cTn>
+                  </p:par>
+                  <p:par>
+                    <p:cTn id="8" fill="hold">
+                      <p:stCondLst>
+                        <p:cond delay="indefinite"/>
+                      </p:stCondLst>
+                      <p:childTnLst>
+                        <p:par>
+                          <p:cTn id="9" fill="hold">
+                            <p:stCondLst>
+                              <p:cond delay="0"/>
+                            </p:stCondLst>
+                            <p:childTnLst>
+                              <p:par>
+                                <p:cTn id="10" presetID="42" presetClass="entr" presetSubtype="0" fill="hold" grpId="0" nodeType="clickEffect">
+                                  <p:stCondLst>
+                                    <p:cond delay="0"/>
+                                  </p:stCondLst>
+                                  <p:childTnLst>
+                                    <p:set>
+                                      <p:cBhvr>
+                                        <p:cTn id="11" dur="1" fill="hold">
+                                          <p:stCondLst>
+                                            <p:cond delay="0"/>
+                                          </p:stCondLst>
+                                        </p:cTn>
+                                        <p:tgtEl>
+                                          <p:spTgt spid="6"/>
+                                        </p:tgtEl>
+                                        <p:attrNameLst>
+                                          <p:attrName>style.visibility</p:attrName>
+                                        </p:attrNameLst>
+                                      </p:cBhvr>
+                                      <p:to>
+                                        <p:strVal val="visible"/>
+                                      </p:to>
+                                    </p:set>
+                                    <p:animEffect transition="in" filter="fade">
+                                      <p:cBhvr>
+                                        <p:cTn id="12" dur="1000"/>
+                                        <p:tgtEl>
+                                          <p:spTgt spid="6"/>
+                                        </p:tgtEl>
+                                      </p:cBhvr>
+                                    </p:animEffect>
+                                    <p:anim calcmode="lin" valueType="num">
+                                      <p:cBhvr>
+                                        <p:cTn id="13" dur="1000" fill="hold"/>
+                                        <p:tgtEl>
+                                          <p:spTgt spid="6"/>
+                                        </p:tgtEl>
+                                        <p:attrNameLst>
+                                          <p:attrName>ppt_x</p:attrName>
+                                        </p:attrNameLst>
+                                      </p:cBhvr>
+                                      <p:tavLst>
+                                        <p:tav tm="0">
+                                          <p:val>
+                                            <p:strVal val="#ppt_x"/>
+                                          </p:val>
+                                        </p:tav>
+                                        <p:tav tm="100000">
+                                          <p:val>
+                                            <p:strVal val="#ppt_x"/>
+                                          </p:val>
+                                        </p:tav>
+                                      </p:tavLst>
+                                    </p:anim>
+                                    <p:anim calcmode="lin" valueType="num">
+                                      <p:cBhvr>
+                                        <p:cTn id="14" dur="1000" fill="hold"/>
+                                        <p:tgtEl>
+                                          <p:spTgt spid="6"/>
+                                        </p:tgtEl>
+                                        <p:attrNameLst>
+                                          <p:attrName>ppt_y</p:attrName>
+                                        </p:attrNameLst>
+                                      </p:cBhvr>
+                                      <p:tavLst>
+                                        <p:tav tm="0">
+                                          <p:val>
+                                            <p:strVal val="#ppt_y+.1"/>
+                                          </p:val>
+                                        </p:tav>
+                                        <p:tav tm="100000">
+                                          <p:val>
+                                            <p:strVal val="#ppt_y"/>
+                                          </p:val>
+                                        </p:tav>
+                                      </p:tavLst>
+                                    </p:anim>
+                                  </p:childTnLst>
+                                </p:cTn>
+                              </p:par>
+                            </p:childTnLst>
+                          </p:cTn>
+                        </p:par>
+                      </p:childTnLst>
+                    </p:cTn>
+                  </p:par>
+                  <p:par>
+                    <p:cTn id="15" fill="hold">
+                      <p:stCondLst>
+                        <p:cond delay="indefinite"/>
+                      </p:stCondLst>
+                      <p:childTnLst>
+                        <p:par>
+                          <p:cTn id="16" fill="hold">
+                            <p:stCondLst>
+                              <p:cond delay="0"/>
+                            </p:stCondLst>
+                            <p:childTnLst>
+                              <p:par>
+                                <p:cTn id="17" presetID="10" presetClass="entr" presetSubtype="0" fill="hold" grpId="0" nodeType="clickEffect">
+                                  <p:stCondLst>
+                                    <p:cond delay="0"/>
+                                  </p:stCondLst>
+                                  <p:childTnLst>
+                                    <p:set>
+                                      <p:cBhvr>
+                                        <p:cTn id="18" dur="1" fill="hold">
+                                          <p:stCondLst>
+                                            <p:cond delay="0"/>
+                                          </p:stCondLst>
+                                        </p:cTn>
+                                        <p:tgtEl>
+                                          <p:spTgt spid="3"/>
+                                        </p:tgtEl>
+                                        <p:attrNameLst>
+                                          <p:attrName>style.visibility</p:attrName>
+                                        </p:attrNameLst>
+                                      </p:cBhvr>
+                                      <p:to>
+                                        <p:strVal val="visible"/>
+                                      </p:to>
+                                    </p:set>
+                                    <p:animEffect transition="in" filter="fade">
+                                      <p:cBhvr>
+                                        <p:cTn id="19" dur="500"/>
+                                        <p:tgtEl>
+                                          <p:spTgt spid="3"/>
+                                        </p:tgtEl>
+                                      </p:cBhvr>
+                                    </p:animEffect>
+                                  </p:childTnLst>
+                                </p:cTn>
+                              </p:par>
+                            </p:childTnLst>
+                          </p:cTn>
+                        </p:par>
+                      </p:childTnLst>
+                    </p:cTn>
+                  </p:par>
+                  <p:par>
+                    <p:cTn id="20" fill="hold">
+                      <p:stCondLst>
+                        <p:cond delay="indefinite"/>
+                      </p:stCondLst>
+                      <p:childTnLst>
+                        <p:par>
+                          <p:cTn id="21" fill="hold">
+                            <p:stCondLst>
+                              <p:cond delay="0"/>
+                            </p:stCondLst>
+                            <p:childTnLst>
+                              <p:par>
+                                <p:cTn id="22" presetID="10" presetClass="entr" presetSubtype="0" fill="hold" grpId="0" nodeType="clickEffect">
+                                  <p:stCondLst>
+                                    <p:cond delay="0"/>
+                                  </p:stCondLst>
+                                  <p:childTnLst>
+                                    <p:set>
+                                      <p:cBhvr>
+                                        <p:cTn id="23" dur="1" fill="hold">
+                                          <p:stCondLst>
+                                            <p:cond delay="0"/>
+                                          </p:stCondLst>
+                                        </p:cTn>
+                                        <p:tgtEl>
+                                          <p:spTgt spid="4"/>
+                                        </p:tgtEl>
+                                        <p:attrNameLst>
+                                          <p:attrName>style.visibility</p:attrName>
+                                        </p:attrNameLst>
+                                      </p:cBhvr>
+                                      <p:to>
+                                        <p:strVal val="visible"/>
+                                      </p:to>
+                                    </p:set>
+                                    <p:animEffect transition="in" filter="fade">
+                                      <p:cBhvr>
+                                        <p:cTn id="24" dur="500"/>
+                                        <p:tgtEl>
+                                          <p:spTgt spid="4"/>
+                                        </p:tgtEl>
+                                      </p:cBhvr>
+                                    </p:animEffect>
+                                  </p:childTnLst>
+                                </p:cTn>
+                              </p:par>
+                            </p:childTnLst>
+                          </p:cTn>
+                        </p:par>
+                      </p:childTnLst>
+                    </p:cTn>
+                  </p:par>
+                </p:childTnLst>
+              </p:cTn>
+              <p:prevCondLst>
+                <p:cond evt="onPrev" delay="0">
+                  <p:tgtEl>
+                    <p:sldTgt/>
+                  </p:tgtEl>
+                </p:cond>
+              </p:prevCondLst>
+              <p:nextCondLst>
+                <p:cond evt="onNext" delay="0">
+                  <p:tgtEl>
+                    <p:sldTgt/>
+                  </p:tgtEl>
+                </p:cond>
+              </p:nextCondLst>
+            </p:seq>
+          </p:childTnLst>
+        </p:cTn>
+      </p:par>
+    </p:tnLst>
+    <p:bldLst>
+      <p:bldP spid="2" grpId="0"/>
+      <p:bldP spid="3" grpId="0"/>
+      <p:bldP spid="6" grpId="0"/>
+      <p:bldP spid="4" grpId="0"/>
+    </p:bldLst>
+  </p:timing>
+</p:sld>
+</file>
+
+<file path=ppt/slides/slide15.xml><?xml version="1.0" encoding="utf-8"?>
+<p:sld xmlns:a="http://schemas.openxmlformats.org/drawingml/2006/main" xmlns:r="http://schemas.openxmlformats.org/officeDocument/2006/relationships" xmlns:p="http://schemas.openxmlformats.org/presentationml/2006/main">
+  <p:cSld>
+    <p:spTree>
+      <p:nvGrpSpPr>
+        <p:cNvPr id="1" name=""/>
+        <p:cNvGrpSpPr/>
+        <p:nvPr/>
+      </p:nvGrpSpPr>
+      <p:grpSpPr>
+        <a:xfrm>
+          <a:off x="0" y="0"/>
+          <a:ext cx="0" cy="0"/>
+          <a:chOff x="0" y="0"/>
+          <a:chExt cx="0" cy="0"/>
+        </a:xfrm>
+      </p:grpSpPr>
+      <p:sp>
+        <p:nvSpPr>
+          <p:cNvPr id="2" name="ZoneTexte 1">
+            <a:extLst>
+              <a:ext uri="{FF2B5EF4-FFF2-40B4-BE49-F238E27FC236}">
+                <a16:creationId xmlns="" xmlns:a16="http://schemas.microsoft.com/office/drawing/2014/main" id="{65415B79-6DA5-423D-BD41-468C26962266}"/>
+              </a:ext>
+            </a:extLst>
+          </p:cNvPr>
+          <p:cNvSpPr txBox="1"/>
+          <p:nvPr/>
+        </p:nvSpPr>
+        <p:spPr>
+          <a:xfrm>
+            <a:off x="1906043" y="1415441"/>
+            <a:ext cx="4851017" cy="4154984"/>
+          </a:xfrm>
+          <a:prstGeom prst="rect">
+            <a:avLst/>
+          </a:prstGeom>
+          <a:noFill/>
+        </p:spPr>
+        <p:txBody>
+          <a:bodyPr rot="0" spcFirstLastPara="0" vertOverflow="overflow" horzOverflow="overflow" vert="horz" wrap="square" lIns="91440" tIns="45720" rIns="91440" bIns="45720" numCol="1" spcCol="0" rtlCol="0" fromWordArt="0" anchor="t" anchorCtr="0" forceAA="0" compatLnSpc="1">
+            <a:prstTxWarp prst="textNoShape">
+              <a:avLst/>
+            </a:prstTxWarp>
+            <a:spAutoFit/>
+          </a:bodyPr>
+          <a:lstStyle/>
+          <a:p>
+            <a:r>
+              <a:rPr lang="fr-FR" sz="2400" dirty="0"/>
+              <a:t>Int main()</a:t>
+            </a:r>
+          </a:p>
+          <a:p>
+            <a:r>
+              <a:rPr lang="fr-FR" sz="2400" dirty="0"/>
+              <a:t>{ </a:t>
+            </a:r>
+            <a:endParaRPr lang="fr-FR" sz="2400" dirty="0">
+              <a:ea typeface="+mn-lt"/>
+              <a:cs typeface="+mn-lt"/>
+            </a:endParaRPr>
+          </a:p>
+          <a:p>
+            <a:r>
+              <a:rPr lang="fr-FR" sz="2400" dirty="0">
+                <a:ea typeface="+mn-lt"/>
+                <a:cs typeface="+mn-lt"/>
+              </a:rPr>
+              <a:t>  Othello table;</a:t>
+            </a:r>
+          </a:p>
+          <a:p>
+            <a:r>
+              <a:rPr lang="fr-FR" sz="2400" dirty="0"/>
+              <a:t>  </a:t>
+            </a:r>
+            <a:r>
+              <a:rPr lang="fr-FR" sz="2400" dirty="0" err="1" smtClean="0"/>
+              <a:t>While</a:t>
+            </a:r>
+            <a:r>
+              <a:rPr lang="fr-FR" sz="2400" dirty="0" smtClean="0"/>
+              <a:t>(</a:t>
+            </a:r>
+            <a:r>
+              <a:rPr lang="fr-FR" sz="2400" dirty="0" err="1" smtClean="0"/>
+              <a:t>table.jeu_termine</a:t>
+            </a:r>
+            <a:r>
+              <a:rPr lang="fr-FR" sz="2400" dirty="0" smtClean="0"/>
+              <a:t>() == false</a:t>
+            </a:r>
+            <a:r>
+              <a:rPr lang="fr-FR" sz="2400" dirty="0"/>
+              <a:t>)</a:t>
+            </a:r>
+          </a:p>
+          <a:p>
+            <a:r>
+              <a:rPr lang="fr-FR" sz="2400" dirty="0" smtClean="0"/>
+              <a:t>	{</a:t>
+            </a:r>
+            <a:endParaRPr lang="fr-FR" sz="2400" dirty="0"/>
+          </a:p>
+          <a:p>
+            <a:r>
+              <a:rPr lang="fr-FR" sz="2400" dirty="0"/>
+              <a:t>   </a:t>
+            </a:r>
+            <a:r>
+              <a:rPr lang="fr-FR" sz="2400" dirty="0">
+                <a:ea typeface="+mn-lt"/>
+                <a:cs typeface="+mn-lt"/>
+              </a:rPr>
+              <a:t>   </a:t>
+            </a:r>
+            <a:r>
+              <a:rPr lang="fr-FR" sz="2400" dirty="0" smtClean="0">
+                <a:ea typeface="+mn-lt"/>
+                <a:cs typeface="+mn-lt"/>
+              </a:rPr>
+              <a:t>	</a:t>
+            </a:r>
+            <a:r>
+              <a:rPr lang="fr-FR" sz="2400" dirty="0" err="1" smtClean="0">
+                <a:ea typeface="+mn-lt"/>
+                <a:cs typeface="+mn-lt"/>
+              </a:rPr>
+              <a:t>table.move</a:t>
+            </a:r>
+            <a:r>
+              <a:rPr lang="fr-FR" sz="2400" dirty="0">
+                <a:ea typeface="+mn-lt"/>
+                <a:cs typeface="+mn-lt"/>
+              </a:rPr>
+              <a:t>();</a:t>
+            </a:r>
+          </a:p>
+          <a:p>
+            <a:r>
+              <a:rPr lang="fr-FR" sz="2400" dirty="0">
+                <a:ea typeface="+mn-lt"/>
+                <a:cs typeface="+mn-lt"/>
+              </a:rPr>
+              <a:t>  </a:t>
+            </a:r>
+            <a:r>
+              <a:rPr lang="fr-FR" sz="2400" dirty="0"/>
+              <a:t>   </a:t>
+            </a:r>
+            <a:r>
+              <a:rPr lang="fr-FR" sz="2400" dirty="0">
+                <a:ea typeface="+mn-lt"/>
+                <a:cs typeface="+mn-lt"/>
+              </a:rPr>
+              <a:t> </a:t>
+            </a:r>
+            <a:r>
+              <a:rPr lang="fr-FR" sz="2400" dirty="0" smtClean="0">
+                <a:ea typeface="+mn-lt"/>
+                <a:cs typeface="+mn-lt"/>
+              </a:rPr>
+              <a:t>	</a:t>
+            </a:r>
+            <a:r>
+              <a:rPr lang="fr-FR" sz="2400" dirty="0" err="1" smtClean="0">
+                <a:ea typeface="+mn-lt"/>
+                <a:cs typeface="+mn-lt"/>
+              </a:rPr>
+              <a:t>table.printBoard</a:t>
+            </a:r>
+            <a:r>
+              <a:rPr lang="fr-FR" sz="2400" dirty="0">
+                <a:ea typeface="+mn-lt"/>
+                <a:cs typeface="+mn-lt"/>
+              </a:rPr>
+              <a:t>();</a:t>
+            </a:r>
+          </a:p>
+          <a:p>
+            <a:r>
+              <a:rPr lang="fr-FR" sz="2400" dirty="0">
+                <a:ea typeface="+mn-lt"/>
+                <a:cs typeface="+mn-lt"/>
+              </a:rPr>
+              <a:t>      </a:t>
+            </a:r>
+            <a:r>
+              <a:rPr lang="fr-FR" sz="2400" dirty="0" smtClean="0">
+                <a:ea typeface="+mn-lt"/>
+                <a:cs typeface="+mn-lt"/>
+              </a:rPr>
+              <a:t>	</a:t>
+            </a:r>
+            <a:r>
+              <a:rPr lang="fr-FR" sz="2400" dirty="0" err="1" smtClean="0">
+                <a:ea typeface="+mn-lt"/>
+                <a:cs typeface="+mn-lt"/>
+              </a:rPr>
+              <a:t>table.passe_tour</a:t>
+            </a:r>
+            <a:r>
+              <a:rPr lang="fr-FR" sz="2400" dirty="0">
+                <a:ea typeface="+mn-lt"/>
+                <a:cs typeface="+mn-lt"/>
+              </a:rPr>
+              <a:t>();</a:t>
+            </a:r>
+          </a:p>
+          <a:p>
+            <a:r>
+              <a:rPr lang="fr-FR" sz="2400" dirty="0" smtClean="0"/>
+              <a:t>	}</a:t>
+            </a:r>
+            <a:endParaRPr lang="fr-FR" sz="2400" dirty="0"/>
+          </a:p>
+          <a:p>
+            <a:r>
+              <a:rPr lang="fr-FR" sz="2400" dirty="0"/>
+              <a:t>   Return 0;</a:t>
+            </a:r>
+          </a:p>
+          <a:p>
+            <a:r>
+              <a:rPr lang="fr-FR" sz="2400" dirty="0"/>
+              <a:t>}</a:t>
+            </a:r>
+            <a:endParaRPr lang="fr-FR" dirty="0"/>
+          </a:p>
+        </p:txBody>
+      </p:sp>
+      <p:sp>
+        <p:nvSpPr>
+          <p:cNvPr id="5" name="ZoneTexte 4">
+            <a:extLst>
+              <a:ext uri="{FF2B5EF4-FFF2-40B4-BE49-F238E27FC236}">
+                <a16:creationId xmlns="" xmlns:a16="http://schemas.microsoft.com/office/drawing/2014/main" id="{660763FB-2142-44C8-94AB-B07EED08557D}"/>
+              </a:ext>
+            </a:extLst>
+          </p:cNvPr>
+          <p:cNvSpPr txBox="1"/>
+          <p:nvPr/>
+        </p:nvSpPr>
+        <p:spPr>
+          <a:xfrm>
+            <a:off x="1279742" y="580373"/>
+            <a:ext cx="2743199" cy="523220"/>
+          </a:xfrm>
+          <a:prstGeom prst="rect">
+            <a:avLst/>
+          </a:prstGeom>
+          <a:noFill/>
+        </p:spPr>
+        <p:txBody>
+          <a:bodyPr rot="0" spcFirstLastPara="0" vertOverflow="overflow" horzOverflow="overflow" vert="horz" wrap="square" lIns="91440" tIns="45720" rIns="91440" bIns="45720" numCol="1" spcCol="0" rtlCol="0" fromWordArt="0" anchor="t" anchorCtr="0" forceAA="0" compatLnSpc="1">
+            <a:prstTxWarp prst="textNoShape">
+              <a:avLst/>
+            </a:prstTxWarp>
+            <a:spAutoFit/>
+          </a:bodyPr>
+          <a:lstStyle/>
+          <a:p>
+            <a:pPr algn="l"/>
+            <a:r>
+              <a:rPr lang="fr-FR" sz="2800" b="1" dirty="0"/>
+              <a:t>Main.cpp</a:t>
+            </a:r>
+          </a:p>
+        </p:txBody>
+      </p:sp>
+    </p:spTree>
+    <p:extLst>
+      <p:ext uri="{BB962C8B-B14F-4D97-AF65-F5344CB8AC3E}">
+        <p14:creationId xmlns:p14="http://schemas.microsoft.com/office/powerpoint/2010/main" val="2197534625"/>
+      </p:ext>
+    </p:extLst>
+  </p:cSld>
+  <p:clrMapOvr>
+    <a:masterClrMapping/>
+  </p:clrMapOvr>
+  <p:timing>
+    <p:tnLst>
+      <p:par>
+        <p:cTn id="1" dur="indefinite" restart="never" nodeType="tmRoot">
+          <p:childTnLst>
+            <p:seq concurrent="1" nextAc="seek">
+              <p:cTn id="2" dur="indefinite" nodeType="mainSeq">
+                <p:childTnLst>
+                  <p:par>
+                    <p:cTn id="3" fill="hold">
+                      <p:stCondLst>
+                        <p:cond delay="indefinite"/>
+                      </p:stCondLst>
+                      <p:childTnLst>
+                        <p:par>
+                          <p:cTn id="4" fill="hold">
+                            <p:stCondLst>
+                              <p:cond delay="0"/>
+                            </p:stCondLst>
+                            <p:childTnLst>
+                              <p:par>
+                                <p:cTn id="5" presetID="22" presetClass="entr" presetSubtype="4" fill="hold" grpId="0" nodeType="clickEffect">
+                                  <p:stCondLst>
+                                    <p:cond delay="0"/>
+                                  </p:stCondLst>
+                                  <p:childTnLst>
+                                    <p:set>
+                                      <p:cBhvr>
+                                        <p:cTn id="6" dur="1" fill="hold">
+                                          <p:stCondLst>
+                                            <p:cond delay="0"/>
+                                          </p:stCondLst>
+                                        </p:cTn>
+                                        <p:tgtEl>
+                                          <p:spTgt spid="5"/>
+                                        </p:tgtEl>
+                                        <p:attrNameLst>
+                                          <p:attrName>style.visibility</p:attrName>
+                                        </p:attrNameLst>
+                                      </p:cBhvr>
+                                      <p:to>
+                                        <p:strVal val="visible"/>
+                                      </p:to>
+                                    </p:set>
+                                    <p:animEffect transition="in" filter="wipe(down)">
+                                      <p:cBhvr>
+                                        <p:cTn id="7" dur="500"/>
+                                        <p:tgtEl>
+                                          <p:spTgt spid="5"/>
+                                        </p:tgtEl>
+                                      </p:cBhvr>
+                                    </p:animEffect>
+                                  </p:childTnLst>
+                                </p:cTn>
+                              </p:par>
+                            </p:childTnLst>
+                          </p:cTn>
+                        </p:par>
+                      </p:childTnLst>
+                    </p:cTn>
+                  </p:par>
+                  <p:par>
+                    <p:cTn id="8" fill="hold">
+                      <p:stCondLst>
+                        <p:cond delay="indefinite"/>
+                      </p:stCondLst>
+                      <p:childTnLst>
+                        <p:par>
+                          <p:cTn id="9" fill="hold">
+                            <p:stCondLst>
+                              <p:cond delay="0"/>
+                            </p:stCondLst>
+                            <p:childTnLst>
+                              <p:par>
+                                <p:cTn id="10" presetID="10" presetClass="entr" presetSubtype="0" fill="hold" grpId="0" nodeType="clickEffect">
+                                  <p:stCondLst>
+                                    <p:cond delay="0"/>
+                                  </p:stCondLst>
+                                  <p:childTnLst>
+                                    <p:set>
+                                      <p:cBhvr>
+                                        <p:cTn id="11" dur="1" fill="hold">
+                                          <p:stCondLst>
+                                            <p:cond delay="0"/>
+                                          </p:stCondLst>
+                                        </p:cTn>
+                                        <p:tgtEl>
+                                          <p:spTgt spid="2"/>
+                                        </p:tgtEl>
+                                        <p:attrNameLst>
+                                          <p:attrName>style.visibility</p:attrName>
+                                        </p:attrNameLst>
+                                      </p:cBhvr>
+                                      <p:to>
+                                        <p:strVal val="visible"/>
+                                      </p:to>
+                                    </p:set>
+                                    <p:animEffect transition="in" filter="fade">
+                                      <p:cBhvr>
+                                        <p:cTn id="12" dur="500"/>
+                                        <p:tgtEl>
+                                          <p:spTgt spid="2"/>
+                                        </p:tgtEl>
+                                      </p:cBhvr>
+                                    </p:animEffect>
+                                  </p:childTnLst>
+                                </p:cTn>
+                              </p:par>
+                            </p:childTnLst>
+                          </p:cTn>
+                        </p:par>
+                      </p:childTnLst>
+                    </p:cTn>
+                  </p:par>
+                </p:childTnLst>
+              </p:cTn>
+              <p:prevCondLst>
+                <p:cond evt="onPrev" delay="0">
+                  <p:tgtEl>
+                    <p:sldTgt/>
+                  </p:tgtEl>
+                </p:cond>
+              </p:prevCondLst>
+              <p:nextCondLst>
+                <p:cond evt="onNext" delay="0">
+                  <p:tgtEl>
+                    <p:sldTgt/>
+                  </p:tgtEl>
+                </p:cond>
+              </p:nextCondLst>
+            </p:seq>
+          </p:childTnLst>
+        </p:cTn>
+      </p:par>
+    </p:tnLst>
+    <p:bldLst>
+      <p:bldP spid="2" grpId="0"/>
+      <p:bldP spid="5" grpId="0"/>
+    </p:bldLst>
+  </p:timing>
+</p:sld>
+</file>
+
 <file path=ppt/slides/slide16.xml><?xml version="1.0" encoding="utf-8"?>
 <p:sld xmlns:a="http://schemas.openxmlformats.org/drawingml/2006/main" xmlns:r="http://schemas.openxmlformats.org/officeDocument/2006/relationships" xmlns:p="http://schemas.openxmlformats.org/presentationml/2006/main">
   <p:cSld>
@@ -7040,6 +8004,13 @@
   <p:clrMapOvr>
     <a:masterClrMapping/>
   </p:clrMapOvr>
+  <p:timing>
+    <p:tnLst>
+      <p:par>
+        <p:cTn id="1" dur="indefinite" restart="never" nodeType="tmRoot"/>
+      </p:par>
+    </p:tnLst>
+  </p:timing>
 </p:sld>
 </file>
 

</xml_diff>